<commit_message>
added upper case option and multiple receivers supported
</commit_message>
<xml_diff>
--- a/Data/Input/SARBATORITI.pptx
+++ b/Data/Input/SARBATORITI.pptx
@@ -2,21 +2,18 @@
 <file path=ppt/presentation.xml><?xml version="1.0" encoding="utf-8"?>
 <p:presentation xmlns:a="http://schemas.openxmlformats.org/drawingml/2006/main" xmlns:r="http://schemas.openxmlformats.org/officeDocument/2006/relationships" xmlns:p="http://schemas.openxmlformats.org/presentationml/2006/main" saveSubsetFonts="1">
   <p:sldMasterIdLst>
-    <p:sldMasterId id="2147483672" r:id="rId1"/>
+    <p:sldMasterId id="2147483648" r:id="rId1"/>
   </p:sldMasterIdLst>
-  <p:notesMasterIdLst>
-    <p:notesMasterId r:id="rId3"/>
-  </p:notesMasterIdLst>
   <p:sldIdLst>
-    <p:sldId id="270" r:id="rId2"/>
+    <p:sldId id="257" r:id="rId2"/>
   </p:sldIdLst>
   <p:sldSz cx="12192000" cy="6858000"/>
-  <p:notesSz cx="4359275" cy="7102475"/>
+  <p:notesSz cx="6858000" cy="9144000"/>
   <p:defaultTextStyle>
     <a:defPPr>
       <a:defRPr lang="en-US"/>
     </a:defPPr>
-    <a:lvl1pPr marL="0" algn="l" defTabSz="457200" rtl="0" eaLnBrk="1" latinLnBrk="0" hangingPunct="1">
+    <a:lvl1pPr marL="0" algn="l" defTabSz="914400" rtl="0" eaLnBrk="1" latinLnBrk="0" hangingPunct="1">
       <a:defRPr sz="1800" kern="1200">
         <a:solidFill>
           <a:schemeClr val="tx1"/>
@@ -26,7 +23,7 @@
         <a:cs typeface="+mn-cs"/>
       </a:defRPr>
     </a:lvl1pPr>
-    <a:lvl2pPr marL="457200" algn="l" defTabSz="457200" rtl="0" eaLnBrk="1" latinLnBrk="0" hangingPunct="1">
+    <a:lvl2pPr marL="457200" algn="l" defTabSz="914400" rtl="0" eaLnBrk="1" latinLnBrk="0" hangingPunct="1">
       <a:defRPr sz="1800" kern="1200">
         <a:solidFill>
           <a:schemeClr val="tx1"/>
@@ -36,7 +33,7 @@
         <a:cs typeface="+mn-cs"/>
       </a:defRPr>
     </a:lvl2pPr>
-    <a:lvl3pPr marL="914400" algn="l" defTabSz="457200" rtl="0" eaLnBrk="1" latinLnBrk="0" hangingPunct="1">
+    <a:lvl3pPr marL="914400" algn="l" defTabSz="914400" rtl="0" eaLnBrk="1" latinLnBrk="0" hangingPunct="1">
       <a:defRPr sz="1800" kern="1200">
         <a:solidFill>
           <a:schemeClr val="tx1"/>
@@ -46,7 +43,7 @@
         <a:cs typeface="+mn-cs"/>
       </a:defRPr>
     </a:lvl3pPr>
-    <a:lvl4pPr marL="1371600" algn="l" defTabSz="457200" rtl="0" eaLnBrk="1" latinLnBrk="0" hangingPunct="1">
+    <a:lvl4pPr marL="1371600" algn="l" defTabSz="914400" rtl="0" eaLnBrk="1" latinLnBrk="0" hangingPunct="1">
       <a:defRPr sz="1800" kern="1200">
         <a:solidFill>
           <a:schemeClr val="tx1"/>
@@ -56,7 +53,7 @@
         <a:cs typeface="+mn-cs"/>
       </a:defRPr>
     </a:lvl4pPr>
-    <a:lvl5pPr marL="1828800" algn="l" defTabSz="457200" rtl="0" eaLnBrk="1" latinLnBrk="0" hangingPunct="1">
+    <a:lvl5pPr marL="1828800" algn="l" defTabSz="914400" rtl="0" eaLnBrk="1" latinLnBrk="0" hangingPunct="1">
       <a:defRPr sz="1800" kern="1200">
         <a:solidFill>
           <a:schemeClr val="tx1"/>
@@ -66,7 +63,7 @@
         <a:cs typeface="+mn-cs"/>
       </a:defRPr>
     </a:lvl5pPr>
-    <a:lvl6pPr marL="2286000" algn="l" defTabSz="457200" rtl="0" eaLnBrk="1" latinLnBrk="0" hangingPunct="1">
+    <a:lvl6pPr marL="2286000" algn="l" defTabSz="914400" rtl="0" eaLnBrk="1" latinLnBrk="0" hangingPunct="1">
       <a:defRPr sz="1800" kern="1200">
         <a:solidFill>
           <a:schemeClr val="tx1"/>
@@ -76,7 +73,7 @@
         <a:cs typeface="+mn-cs"/>
       </a:defRPr>
     </a:lvl6pPr>
-    <a:lvl7pPr marL="2743200" algn="l" defTabSz="457200" rtl="0" eaLnBrk="1" latinLnBrk="0" hangingPunct="1">
+    <a:lvl7pPr marL="2743200" algn="l" defTabSz="914400" rtl="0" eaLnBrk="1" latinLnBrk="0" hangingPunct="1">
       <a:defRPr sz="1800" kern="1200">
         <a:solidFill>
           <a:schemeClr val="tx1"/>
@@ -86,7 +83,7 @@
         <a:cs typeface="+mn-cs"/>
       </a:defRPr>
     </a:lvl7pPr>
-    <a:lvl8pPr marL="3200400" algn="l" defTabSz="457200" rtl="0" eaLnBrk="1" latinLnBrk="0" hangingPunct="1">
+    <a:lvl8pPr marL="3200400" algn="l" defTabSz="914400" rtl="0" eaLnBrk="1" latinLnBrk="0" hangingPunct="1">
       <a:defRPr sz="1800" kern="1200">
         <a:solidFill>
           <a:schemeClr val="tx1"/>
@@ -96,7 +93,7 @@
         <a:cs typeface="+mn-cs"/>
       </a:defRPr>
     </a:lvl8pPr>
-    <a:lvl9pPr marL="3657600" algn="l" defTabSz="457200" rtl="0" eaLnBrk="1" latinLnBrk="0" hangingPunct="1">
+    <a:lvl9pPr marL="3657600" algn="l" defTabSz="914400" rtl="0" eaLnBrk="1" latinLnBrk="0" hangingPunct="1">
       <a:defRPr sz="1800" kern="1200">
         <a:solidFill>
           <a:schemeClr val="tx1"/>
@@ -111,445 +108,8 @@
     <p:ext uri="{EFAFB233-063F-42B5-8137-9DF3F51BA10A}">
       <p15:sldGuideLst xmlns:p15="http://schemas.microsoft.com/office/powerpoint/2012/main"/>
     </p:ext>
-    <p:ext uri="{2D200454-40CA-4A62-9FC3-DE9A4176ACB9}">
-      <p15:notesGuideLst xmlns:p15="http://schemas.microsoft.com/office/powerpoint/2012/main"/>
-    </p:ext>
   </p:extLst>
 </p:presentation>
-</file>
-
-<file path=ppt/notesMasters/notesMaster1.xml><?xml version="1.0" encoding="utf-8"?>
-<p:notesMaster xmlns:a="http://schemas.openxmlformats.org/drawingml/2006/main" xmlns:r="http://schemas.openxmlformats.org/officeDocument/2006/relationships" xmlns:p="http://schemas.openxmlformats.org/presentationml/2006/main">
-  <p:cSld>
-    <p:bg>
-      <p:bgRef idx="1001">
-        <a:schemeClr val="bg1"/>
-      </p:bgRef>
-    </p:bg>
-    <p:spTree>
-      <p:nvGrpSpPr>
-        <p:cNvPr id="1" name=""/>
-        <p:cNvGrpSpPr/>
-        <p:nvPr/>
-      </p:nvGrpSpPr>
-      <p:grpSpPr>
-        <a:xfrm>
-          <a:off x="0" y="0"/>
-          <a:ext cx="0" cy="0"/>
-          <a:chOff x="0" y="0"/>
-          <a:chExt cx="0" cy="0"/>
-        </a:xfrm>
-      </p:grpSpPr>
-      <p:sp>
-        <p:nvSpPr>
-          <p:cNvPr id="2" name="Substituent antet 1"/>
-          <p:cNvSpPr>
-            <a:spLocks noGrp="1"/>
-          </p:cNvSpPr>
-          <p:nvPr>
-            <p:ph type="hdr" sz="quarter"/>
-          </p:nvPr>
-        </p:nvSpPr>
-        <p:spPr>
-          <a:xfrm>
-            <a:off x="0" y="0"/>
-            <a:ext cx="1889019" cy="356357"/>
-          </a:xfrm>
-          <a:prstGeom prst="rect">
-            <a:avLst/>
-          </a:prstGeom>
-        </p:spPr>
-        <p:txBody>
-          <a:bodyPr vert="horz" lIns="65489" tIns="32745" rIns="65489" bIns="32745" rtlCol="0"/>
-          <a:lstStyle>
-            <a:lvl1pPr algn="l">
-              <a:defRPr sz="900"/>
-            </a:lvl1pPr>
-          </a:lstStyle>
-          <a:p>
-            <a:endParaRPr lang="en-US"/>
-          </a:p>
-        </p:txBody>
-      </p:sp>
-      <p:sp>
-        <p:nvSpPr>
-          <p:cNvPr id="3" name="Substituent dată 2"/>
-          <p:cNvSpPr>
-            <a:spLocks noGrp="1"/>
-          </p:cNvSpPr>
-          <p:nvPr>
-            <p:ph type="dt" idx="1"/>
-          </p:nvPr>
-        </p:nvSpPr>
-        <p:spPr>
-          <a:xfrm>
-            <a:off x="2469247" y="0"/>
-            <a:ext cx="1889019" cy="356357"/>
-          </a:xfrm>
-          <a:prstGeom prst="rect">
-            <a:avLst/>
-          </a:prstGeom>
-        </p:spPr>
-        <p:txBody>
-          <a:bodyPr vert="horz" lIns="65489" tIns="32745" rIns="65489" bIns="32745" rtlCol="0"/>
-          <a:lstStyle>
-            <a:lvl1pPr algn="r">
-              <a:defRPr sz="900"/>
-            </a:lvl1pPr>
-          </a:lstStyle>
-          <a:p>
-            <a:fld id="{59578531-6E6A-4C64-B6B0-42960CE6F635}" type="datetimeFigureOut">
-              <a:rPr lang="en-US" smtClean="0"/>
-              <a:t>10/15/2022</a:t>
-            </a:fld>
-            <a:endParaRPr lang="en-US"/>
-          </a:p>
-        </p:txBody>
-      </p:sp>
-      <p:sp>
-        <p:nvSpPr>
-          <p:cNvPr id="4" name="Substituent imagine diapozitiv 3"/>
-          <p:cNvSpPr>
-            <a:spLocks noGrp="1" noRot="1" noChangeAspect="1"/>
-          </p:cNvSpPr>
-          <p:nvPr>
-            <p:ph type="sldImg" idx="2"/>
-          </p:nvPr>
-        </p:nvSpPr>
-        <p:spPr>
-          <a:xfrm>
-            <a:off x="49213" y="887413"/>
-            <a:ext cx="4260850" cy="2397125"/>
-          </a:xfrm>
-          <a:prstGeom prst="rect">
-            <a:avLst/>
-          </a:prstGeom>
-          <a:noFill/>
-          <a:ln w="12700">
-            <a:solidFill>
-              <a:prstClr val="black"/>
-            </a:solidFill>
-          </a:ln>
-        </p:spPr>
-        <p:txBody>
-          <a:bodyPr vert="horz" lIns="65489" tIns="32745" rIns="65489" bIns="32745" rtlCol="0" anchor="ctr"/>
-          <a:lstStyle/>
-          <a:p>
-            <a:endParaRPr lang="en-US"/>
-          </a:p>
-        </p:txBody>
-      </p:sp>
-      <p:sp>
-        <p:nvSpPr>
-          <p:cNvPr id="5" name="Substituent note 4"/>
-          <p:cNvSpPr>
-            <a:spLocks noGrp="1"/>
-          </p:cNvSpPr>
-          <p:nvPr>
-            <p:ph type="body" sz="quarter" idx="3"/>
-          </p:nvPr>
-        </p:nvSpPr>
-        <p:spPr>
-          <a:xfrm>
-            <a:off x="435928" y="3418066"/>
-            <a:ext cx="3487420" cy="2796600"/>
-          </a:xfrm>
-          <a:prstGeom prst="rect">
-            <a:avLst/>
-          </a:prstGeom>
-        </p:spPr>
-        <p:txBody>
-          <a:bodyPr vert="horz" lIns="65489" tIns="32745" rIns="65489" bIns="32745" rtlCol="0"/>
-          <a:lstStyle/>
-          <a:p>
-            <a:pPr lvl="0"/>
-            <a:r>
-              <a:rPr lang="ro-RO"/>
-              <a:t>Editați stilurile de text coordonator</a:t>
-            </a:r>
-          </a:p>
-          <a:p>
-            <a:pPr lvl="1"/>
-            <a:r>
-              <a:rPr lang="ro-RO"/>
-              <a:t>Al doilea nivel</a:t>
-            </a:r>
-          </a:p>
-          <a:p>
-            <a:pPr lvl="2"/>
-            <a:r>
-              <a:rPr lang="ro-RO"/>
-              <a:t>Al treilea nivel</a:t>
-            </a:r>
-          </a:p>
-          <a:p>
-            <a:pPr lvl="3"/>
-            <a:r>
-              <a:rPr lang="ro-RO"/>
-              <a:t>Al patrulea nivel</a:t>
-            </a:r>
-          </a:p>
-          <a:p>
-            <a:pPr lvl="4"/>
-            <a:r>
-              <a:rPr lang="ro-RO"/>
-              <a:t>Al cincilea nivel</a:t>
-            </a:r>
-            <a:endParaRPr lang="en-US"/>
-          </a:p>
-        </p:txBody>
-      </p:sp>
-      <p:sp>
-        <p:nvSpPr>
-          <p:cNvPr id="6" name="Substituent subsol 5"/>
-          <p:cNvSpPr>
-            <a:spLocks noGrp="1"/>
-          </p:cNvSpPr>
-          <p:nvPr>
-            <p:ph type="ftr" sz="quarter" idx="4"/>
-          </p:nvPr>
-        </p:nvSpPr>
-        <p:spPr>
-          <a:xfrm>
-            <a:off x="0" y="6746119"/>
-            <a:ext cx="1889019" cy="356356"/>
-          </a:xfrm>
-          <a:prstGeom prst="rect">
-            <a:avLst/>
-          </a:prstGeom>
-        </p:spPr>
-        <p:txBody>
-          <a:bodyPr vert="horz" lIns="65489" tIns="32745" rIns="65489" bIns="32745" rtlCol="0" anchor="b"/>
-          <a:lstStyle>
-            <a:lvl1pPr algn="l">
-              <a:defRPr sz="900"/>
-            </a:lvl1pPr>
-          </a:lstStyle>
-          <a:p>
-            <a:endParaRPr lang="en-US"/>
-          </a:p>
-        </p:txBody>
-      </p:sp>
-      <p:sp>
-        <p:nvSpPr>
-          <p:cNvPr id="7" name="Substituent număr diapozitiv 6"/>
-          <p:cNvSpPr>
-            <a:spLocks noGrp="1"/>
-          </p:cNvSpPr>
-          <p:nvPr>
-            <p:ph type="sldNum" sz="quarter" idx="5"/>
-          </p:nvPr>
-        </p:nvSpPr>
-        <p:spPr>
-          <a:xfrm>
-            <a:off x="2469247" y="6746119"/>
-            <a:ext cx="1889019" cy="356356"/>
-          </a:xfrm>
-          <a:prstGeom prst="rect">
-            <a:avLst/>
-          </a:prstGeom>
-        </p:spPr>
-        <p:txBody>
-          <a:bodyPr vert="horz" lIns="65489" tIns="32745" rIns="65489" bIns="32745" rtlCol="0" anchor="b"/>
-          <a:lstStyle>
-            <a:lvl1pPr algn="r">
-              <a:defRPr sz="900"/>
-            </a:lvl1pPr>
-          </a:lstStyle>
-          <a:p>
-            <a:fld id="{B916AB04-02A5-400A-A79F-9BA697398AA0}" type="slidenum">
-              <a:rPr lang="en-US" smtClean="0"/>
-              <a:t>‹#›</a:t>
-            </a:fld>
-            <a:endParaRPr lang="en-US"/>
-          </a:p>
-        </p:txBody>
-      </p:sp>
-    </p:spTree>
-    <p:extLst>
-      <p:ext uri="{BB962C8B-B14F-4D97-AF65-F5344CB8AC3E}">
-        <p14:creationId xmlns:p14="http://schemas.microsoft.com/office/powerpoint/2010/main" val="276102996"/>
-      </p:ext>
-    </p:extLst>
-  </p:cSld>
-  <p:clrMap bg1="lt1" tx1="dk1" bg2="lt2" tx2="dk2" accent1="accent1" accent2="accent2" accent3="accent3" accent4="accent4" accent5="accent5" accent6="accent6" hlink="hlink" folHlink="folHlink"/>
-  <p:notesStyle>
-    <a:lvl1pPr marL="0" algn="l" defTabSz="914400" rtl="0" eaLnBrk="1" latinLnBrk="0" hangingPunct="1">
-      <a:defRPr sz="1200" kern="1200">
-        <a:solidFill>
-          <a:schemeClr val="tx1"/>
-        </a:solidFill>
-        <a:latin typeface="+mn-lt"/>
-        <a:ea typeface="+mn-ea"/>
-        <a:cs typeface="+mn-cs"/>
-      </a:defRPr>
-    </a:lvl1pPr>
-    <a:lvl2pPr marL="457200" algn="l" defTabSz="914400" rtl="0" eaLnBrk="1" latinLnBrk="0" hangingPunct="1">
-      <a:defRPr sz="1200" kern="1200">
-        <a:solidFill>
-          <a:schemeClr val="tx1"/>
-        </a:solidFill>
-        <a:latin typeface="+mn-lt"/>
-        <a:ea typeface="+mn-ea"/>
-        <a:cs typeface="+mn-cs"/>
-      </a:defRPr>
-    </a:lvl2pPr>
-    <a:lvl3pPr marL="914400" algn="l" defTabSz="914400" rtl="0" eaLnBrk="1" latinLnBrk="0" hangingPunct="1">
-      <a:defRPr sz="1200" kern="1200">
-        <a:solidFill>
-          <a:schemeClr val="tx1"/>
-        </a:solidFill>
-        <a:latin typeface="+mn-lt"/>
-        <a:ea typeface="+mn-ea"/>
-        <a:cs typeface="+mn-cs"/>
-      </a:defRPr>
-    </a:lvl3pPr>
-    <a:lvl4pPr marL="1371600" algn="l" defTabSz="914400" rtl="0" eaLnBrk="1" latinLnBrk="0" hangingPunct="1">
-      <a:defRPr sz="1200" kern="1200">
-        <a:solidFill>
-          <a:schemeClr val="tx1"/>
-        </a:solidFill>
-        <a:latin typeface="+mn-lt"/>
-        <a:ea typeface="+mn-ea"/>
-        <a:cs typeface="+mn-cs"/>
-      </a:defRPr>
-    </a:lvl4pPr>
-    <a:lvl5pPr marL="1828800" algn="l" defTabSz="914400" rtl="0" eaLnBrk="1" latinLnBrk="0" hangingPunct="1">
-      <a:defRPr sz="1200" kern="1200">
-        <a:solidFill>
-          <a:schemeClr val="tx1"/>
-        </a:solidFill>
-        <a:latin typeface="+mn-lt"/>
-        <a:ea typeface="+mn-ea"/>
-        <a:cs typeface="+mn-cs"/>
-      </a:defRPr>
-    </a:lvl5pPr>
-    <a:lvl6pPr marL="2286000" algn="l" defTabSz="914400" rtl="0" eaLnBrk="1" latinLnBrk="0" hangingPunct="1">
-      <a:defRPr sz="1200" kern="1200">
-        <a:solidFill>
-          <a:schemeClr val="tx1"/>
-        </a:solidFill>
-        <a:latin typeface="+mn-lt"/>
-        <a:ea typeface="+mn-ea"/>
-        <a:cs typeface="+mn-cs"/>
-      </a:defRPr>
-    </a:lvl6pPr>
-    <a:lvl7pPr marL="2743200" algn="l" defTabSz="914400" rtl="0" eaLnBrk="1" latinLnBrk="0" hangingPunct="1">
-      <a:defRPr sz="1200" kern="1200">
-        <a:solidFill>
-          <a:schemeClr val="tx1"/>
-        </a:solidFill>
-        <a:latin typeface="+mn-lt"/>
-        <a:ea typeface="+mn-ea"/>
-        <a:cs typeface="+mn-cs"/>
-      </a:defRPr>
-    </a:lvl7pPr>
-    <a:lvl8pPr marL="3200400" algn="l" defTabSz="914400" rtl="0" eaLnBrk="1" latinLnBrk="0" hangingPunct="1">
-      <a:defRPr sz="1200" kern="1200">
-        <a:solidFill>
-          <a:schemeClr val="tx1"/>
-        </a:solidFill>
-        <a:latin typeface="+mn-lt"/>
-        <a:ea typeface="+mn-ea"/>
-        <a:cs typeface="+mn-cs"/>
-      </a:defRPr>
-    </a:lvl8pPr>
-    <a:lvl9pPr marL="3657600" algn="l" defTabSz="914400" rtl="0" eaLnBrk="1" latinLnBrk="0" hangingPunct="1">
-      <a:defRPr sz="1200" kern="1200">
-        <a:solidFill>
-          <a:schemeClr val="tx1"/>
-        </a:solidFill>
-        <a:latin typeface="+mn-lt"/>
-        <a:ea typeface="+mn-ea"/>
-        <a:cs typeface="+mn-cs"/>
-      </a:defRPr>
-    </a:lvl9pPr>
-  </p:notesStyle>
-</p:notesMaster>
-</file>
-
-<file path=ppt/notesSlides/notesSlide1.xml><?xml version="1.0" encoding="utf-8"?>
-<p:notes xmlns:a="http://schemas.openxmlformats.org/drawingml/2006/main" xmlns:r="http://schemas.openxmlformats.org/officeDocument/2006/relationships" xmlns:p="http://schemas.openxmlformats.org/presentationml/2006/main">
-  <p:cSld>
-    <p:spTree>
-      <p:nvGrpSpPr>
-        <p:cNvPr id="1" name=""/>
-        <p:cNvGrpSpPr/>
-        <p:nvPr/>
-      </p:nvGrpSpPr>
-      <p:grpSpPr>
-        <a:xfrm>
-          <a:off x="0" y="0"/>
-          <a:ext cx="0" cy="0"/>
-          <a:chOff x="0" y="0"/>
-          <a:chExt cx="0" cy="0"/>
-        </a:xfrm>
-      </p:grpSpPr>
-      <p:sp>
-        <p:nvSpPr>
-          <p:cNvPr id="2" name="Substituent imagine diapozitiv 1"/>
-          <p:cNvSpPr>
-            <a:spLocks noGrp="1" noRot="1" noChangeAspect="1"/>
-          </p:cNvSpPr>
-          <p:nvPr>
-            <p:ph type="sldImg"/>
-          </p:nvPr>
-        </p:nvSpPr>
-        <p:spPr/>
-      </p:sp>
-      <p:sp>
-        <p:nvSpPr>
-          <p:cNvPr id="3" name="Substituent note 2"/>
-          <p:cNvSpPr>
-            <a:spLocks noGrp="1"/>
-          </p:cNvSpPr>
-          <p:nvPr>
-            <p:ph type="body" idx="1"/>
-          </p:nvPr>
-        </p:nvSpPr>
-        <p:spPr/>
-        <p:txBody>
-          <a:bodyPr/>
-          <a:lstStyle/>
-          <a:p>
-            <a:endParaRPr lang="en-US" dirty="0"/>
-          </a:p>
-        </p:txBody>
-      </p:sp>
-      <p:sp>
-        <p:nvSpPr>
-          <p:cNvPr id="4" name="Substituent număr diapozitiv 3"/>
-          <p:cNvSpPr>
-            <a:spLocks noGrp="1"/>
-          </p:cNvSpPr>
-          <p:nvPr>
-            <p:ph type="sldNum" sz="quarter" idx="10"/>
-          </p:nvPr>
-        </p:nvSpPr>
-        <p:spPr/>
-        <p:txBody>
-          <a:bodyPr/>
-          <a:lstStyle/>
-          <a:p>
-            <a:fld id="{B916AB04-02A5-400A-A79F-9BA697398AA0}" type="slidenum">
-              <a:rPr lang="en-US" smtClean="0"/>
-              <a:t>1</a:t>
-            </a:fld>
-            <a:endParaRPr lang="en-US"/>
-          </a:p>
-        </p:txBody>
-      </p:sp>
-    </p:spTree>
-    <p:extLst>
-      <p:ext uri="{BB962C8B-B14F-4D97-AF65-F5344CB8AC3E}">
-        <p14:creationId xmlns:p14="http://schemas.microsoft.com/office/powerpoint/2010/main" val="3706868610"/>
-      </p:ext>
-    </p:extLst>
-  </p:cSld>
-  <p:clrMapOvr>
-    <a:masterClrMapping/>
-  </p:clrMapOvr>
-</p:notes>
 </file>
 
 <file path=ppt/slideLayouts/slideLayout1.xml><?xml version="1.0" encoding="utf-8"?>
@@ -571,7 +131,13 @@
       </p:grpSpPr>
       <p:sp>
         <p:nvSpPr>
-          <p:cNvPr id="2" name="Title 1"/>
+          <p:cNvPr id="2" name="Title 1">
+            <a:extLst>
+              <a:ext uri="{FF2B5EF4-FFF2-40B4-BE49-F238E27FC236}">
+                <a16:creationId xmlns:a16="http://schemas.microsoft.com/office/drawing/2014/main" id="{B6F68BB1-51EF-19A0-1AAA-4877D4AAB796}"/>
+              </a:ext>
+            </a:extLst>
+          </p:cNvPr>
           <p:cNvSpPr>
             <a:spLocks noGrp="1"/>
           </p:cNvSpPr>
@@ -594,16 +160,21 @@
           </a:lstStyle>
           <a:p>
             <a:r>
-              <a:rPr lang="en-GB"/>
+              <a:rPr lang="en-US"/>
               <a:t>Click to edit Master title style</a:t>
             </a:r>
-            <a:endParaRPr lang="en-US" dirty="0"/>
-          </a:p>
-        </p:txBody>
-      </p:sp>
-      <p:sp>
-        <p:nvSpPr>
-          <p:cNvPr id="3" name="Subtitle 2"/>
+          </a:p>
+        </p:txBody>
+      </p:sp>
+      <p:sp>
+        <p:nvSpPr>
+          <p:cNvPr id="3" name="Subtitle 2">
+            <a:extLst>
+              <a:ext uri="{FF2B5EF4-FFF2-40B4-BE49-F238E27FC236}">
+                <a16:creationId xmlns:a16="http://schemas.microsoft.com/office/drawing/2014/main" id="{7EF596B9-458B-0541-7A99-465E25137D4E}"/>
+              </a:ext>
+            </a:extLst>
+          </p:cNvPr>
           <p:cNvSpPr>
             <a:spLocks noGrp="1"/>
           </p:cNvSpPr>
@@ -659,16 +230,21 @@
           </a:lstStyle>
           <a:p>
             <a:r>
-              <a:rPr lang="en-GB"/>
+              <a:rPr lang="en-US"/>
               <a:t>Click to edit Master subtitle style</a:t>
             </a:r>
-            <a:endParaRPr lang="en-US" dirty="0"/>
-          </a:p>
-        </p:txBody>
-      </p:sp>
-      <p:sp>
-        <p:nvSpPr>
-          <p:cNvPr id="4" name="Date Placeholder 3"/>
+          </a:p>
+        </p:txBody>
+      </p:sp>
+      <p:sp>
+        <p:nvSpPr>
+          <p:cNvPr id="4" name="Date Placeholder 3">
+            <a:extLst>
+              <a:ext uri="{FF2B5EF4-FFF2-40B4-BE49-F238E27FC236}">
+                <a16:creationId xmlns:a16="http://schemas.microsoft.com/office/drawing/2014/main" id="{A551D6B9-D7C0-9507-8C3C-DF0E17A9FE9C}"/>
+              </a:ext>
+            </a:extLst>
+          </p:cNvPr>
           <p:cNvSpPr>
             <a:spLocks noGrp="1"/>
           </p:cNvSpPr>
@@ -681,9 +257,9 @@
           <a:bodyPr/>
           <a:lstStyle/>
           <a:p>
-            <a:fld id="{F6606698-BDAE-417D-A65D-A2C440CD0FC2}" type="datetimeFigureOut">
+            <a:fld id="{C32AD3BE-FDB2-4E6E-AF52-0FC17BD47529}" type="datetimeFigureOut">
               <a:rPr lang="en-US" smtClean="0"/>
-              <a:t>10/15/2022</a:t>
+              <a:t>10/16/2022</a:t>
             </a:fld>
             <a:endParaRPr lang="en-US"/>
           </a:p>
@@ -691,7 +267,13 @@
       </p:sp>
       <p:sp>
         <p:nvSpPr>
-          <p:cNvPr id="5" name="Footer Placeholder 4"/>
+          <p:cNvPr id="5" name="Footer Placeholder 4">
+            <a:extLst>
+              <a:ext uri="{FF2B5EF4-FFF2-40B4-BE49-F238E27FC236}">
+                <a16:creationId xmlns:a16="http://schemas.microsoft.com/office/drawing/2014/main" id="{9E1D9367-5176-7CF8-D5CE-0C17C0008763}"/>
+              </a:ext>
+            </a:extLst>
+          </p:cNvPr>
           <p:cNvSpPr>
             <a:spLocks noGrp="1"/>
           </p:cNvSpPr>
@@ -710,7 +292,13 @@
       </p:sp>
       <p:sp>
         <p:nvSpPr>
-          <p:cNvPr id="6" name="Slide Number Placeholder 5"/>
+          <p:cNvPr id="6" name="Slide Number Placeholder 5">
+            <a:extLst>
+              <a:ext uri="{FF2B5EF4-FFF2-40B4-BE49-F238E27FC236}">
+                <a16:creationId xmlns:a16="http://schemas.microsoft.com/office/drawing/2014/main" id="{8AC9E115-2F30-2479-32D5-08045CFF8406}"/>
+              </a:ext>
+            </a:extLst>
+          </p:cNvPr>
           <p:cNvSpPr>
             <a:spLocks noGrp="1"/>
           </p:cNvSpPr>
@@ -723,7 +311,7 @@
           <a:bodyPr/>
           <a:lstStyle/>
           <a:p>
-            <a:fld id="{B8D60ABD-1DB8-4EBF-9803-33819397B5FC}" type="slidenum">
+            <a:fld id="{A849C772-AF0D-43AD-ADF6-6468DBE82806}" type="slidenum">
               <a:rPr lang="en-US" smtClean="0"/>
               <a:t>‹#›</a:t>
             </a:fld>
@@ -734,7 +322,7 @@
     </p:spTree>
     <p:extLst>
       <p:ext uri="{BB962C8B-B14F-4D97-AF65-F5344CB8AC3E}">
-        <p14:creationId xmlns:p14="http://schemas.microsoft.com/office/powerpoint/2010/main" val="894113159"/>
+        <p14:creationId xmlns:p14="http://schemas.microsoft.com/office/powerpoint/2010/main" val="2316718636"/>
       </p:ext>
     </p:extLst>
   </p:cSld>
@@ -763,7 +351,13 @@
       </p:grpSpPr>
       <p:sp>
         <p:nvSpPr>
-          <p:cNvPr id="2" name="Title 1"/>
+          <p:cNvPr id="2" name="Title 1">
+            <a:extLst>
+              <a:ext uri="{FF2B5EF4-FFF2-40B4-BE49-F238E27FC236}">
+                <a16:creationId xmlns:a16="http://schemas.microsoft.com/office/drawing/2014/main" id="{7766002B-5047-0F89-9AA6-CE73797F4455}"/>
+              </a:ext>
+            </a:extLst>
+          </p:cNvPr>
           <p:cNvSpPr>
             <a:spLocks noGrp="1"/>
           </p:cNvSpPr>
@@ -777,16 +371,21 @@
           <a:lstStyle/>
           <a:p>
             <a:r>
-              <a:rPr lang="en-GB"/>
+              <a:rPr lang="en-US"/>
               <a:t>Click to edit Master title style</a:t>
             </a:r>
-            <a:endParaRPr lang="en-US" dirty="0"/>
-          </a:p>
-        </p:txBody>
-      </p:sp>
-      <p:sp>
-        <p:nvSpPr>
-          <p:cNvPr id="3" name="Vertical Text Placeholder 2"/>
+          </a:p>
+        </p:txBody>
+      </p:sp>
+      <p:sp>
+        <p:nvSpPr>
+          <p:cNvPr id="3" name="Vertical Text Placeholder 2">
+            <a:extLst>
+              <a:ext uri="{FF2B5EF4-FFF2-40B4-BE49-F238E27FC236}">
+                <a16:creationId xmlns:a16="http://schemas.microsoft.com/office/drawing/2014/main" id="{A9A52C30-3086-DA90-1058-2AF03CD131B0}"/>
+              </a:ext>
+            </a:extLst>
+          </p:cNvPr>
           <p:cNvSpPr>
             <a:spLocks noGrp="1"/>
           </p:cNvSpPr>
@@ -801,44 +400,49 @@
           <a:p>
             <a:pPr lvl="0"/>
             <a:r>
-              <a:rPr lang="en-GB"/>
+              <a:rPr lang="en-US"/>
               <a:t>Click to edit Master text styles</a:t>
             </a:r>
           </a:p>
           <a:p>
             <a:pPr lvl="1"/>
             <a:r>
-              <a:rPr lang="en-GB"/>
+              <a:rPr lang="en-US"/>
               <a:t>Second level</a:t>
             </a:r>
           </a:p>
           <a:p>
             <a:pPr lvl="2"/>
             <a:r>
-              <a:rPr lang="en-GB"/>
+              <a:rPr lang="en-US"/>
               <a:t>Third level</a:t>
             </a:r>
           </a:p>
           <a:p>
             <a:pPr lvl="3"/>
             <a:r>
-              <a:rPr lang="en-GB"/>
+              <a:rPr lang="en-US"/>
               <a:t>Fourth level</a:t>
             </a:r>
           </a:p>
           <a:p>
             <a:pPr lvl="4"/>
             <a:r>
-              <a:rPr lang="en-GB"/>
+              <a:rPr lang="en-US"/>
               <a:t>Fifth level</a:t>
             </a:r>
-            <a:endParaRPr lang="en-US" dirty="0"/>
-          </a:p>
-        </p:txBody>
-      </p:sp>
-      <p:sp>
-        <p:nvSpPr>
-          <p:cNvPr id="4" name="Date Placeholder 3"/>
+          </a:p>
+        </p:txBody>
+      </p:sp>
+      <p:sp>
+        <p:nvSpPr>
+          <p:cNvPr id="4" name="Date Placeholder 3">
+            <a:extLst>
+              <a:ext uri="{FF2B5EF4-FFF2-40B4-BE49-F238E27FC236}">
+                <a16:creationId xmlns:a16="http://schemas.microsoft.com/office/drawing/2014/main" id="{83561E9F-6B5D-DFBC-BD5C-E64BE9B49712}"/>
+              </a:ext>
+            </a:extLst>
+          </p:cNvPr>
           <p:cNvSpPr>
             <a:spLocks noGrp="1"/>
           </p:cNvSpPr>
@@ -851,9 +455,9 @@
           <a:bodyPr/>
           <a:lstStyle/>
           <a:p>
-            <a:fld id="{F6606698-BDAE-417D-A65D-A2C440CD0FC2}" type="datetimeFigureOut">
+            <a:fld id="{C32AD3BE-FDB2-4E6E-AF52-0FC17BD47529}" type="datetimeFigureOut">
               <a:rPr lang="en-US" smtClean="0"/>
-              <a:t>10/15/2022</a:t>
+              <a:t>10/16/2022</a:t>
             </a:fld>
             <a:endParaRPr lang="en-US"/>
           </a:p>
@@ -861,7 +465,13 @@
       </p:sp>
       <p:sp>
         <p:nvSpPr>
-          <p:cNvPr id="5" name="Footer Placeholder 4"/>
+          <p:cNvPr id="5" name="Footer Placeholder 4">
+            <a:extLst>
+              <a:ext uri="{FF2B5EF4-FFF2-40B4-BE49-F238E27FC236}">
+                <a16:creationId xmlns:a16="http://schemas.microsoft.com/office/drawing/2014/main" id="{B1811AE4-DD41-D753-42CE-E139252FC2A1}"/>
+              </a:ext>
+            </a:extLst>
+          </p:cNvPr>
           <p:cNvSpPr>
             <a:spLocks noGrp="1"/>
           </p:cNvSpPr>
@@ -880,7 +490,13 @@
       </p:sp>
       <p:sp>
         <p:nvSpPr>
-          <p:cNvPr id="6" name="Slide Number Placeholder 5"/>
+          <p:cNvPr id="6" name="Slide Number Placeholder 5">
+            <a:extLst>
+              <a:ext uri="{FF2B5EF4-FFF2-40B4-BE49-F238E27FC236}">
+                <a16:creationId xmlns:a16="http://schemas.microsoft.com/office/drawing/2014/main" id="{6B765303-7D3C-F264-EF10-F2E165A784F0}"/>
+              </a:ext>
+            </a:extLst>
+          </p:cNvPr>
           <p:cNvSpPr>
             <a:spLocks noGrp="1"/>
           </p:cNvSpPr>
@@ -893,7 +509,7 @@
           <a:bodyPr/>
           <a:lstStyle/>
           <a:p>
-            <a:fld id="{B8D60ABD-1DB8-4EBF-9803-33819397B5FC}" type="slidenum">
+            <a:fld id="{A849C772-AF0D-43AD-ADF6-6468DBE82806}" type="slidenum">
               <a:rPr lang="en-US" smtClean="0"/>
               <a:t>‹#›</a:t>
             </a:fld>
@@ -904,7 +520,7 @@
     </p:spTree>
     <p:extLst>
       <p:ext uri="{BB962C8B-B14F-4D97-AF65-F5344CB8AC3E}">
-        <p14:creationId xmlns:p14="http://schemas.microsoft.com/office/powerpoint/2010/main" val="2360726226"/>
+        <p14:creationId xmlns:p14="http://schemas.microsoft.com/office/powerpoint/2010/main" val="1792215226"/>
       </p:ext>
     </p:extLst>
   </p:cSld>
@@ -933,7 +549,13 @@
       </p:grpSpPr>
       <p:sp>
         <p:nvSpPr>
-          <p:cNvPr id="2" name="Vertical Title 1"/>
+          <p:cNvPr id="2" name="Vertical Title 1">
+            <a:extLst>
+              <a:ext uri="{FF2B5EF4-FFF2-40B4-BE49-F238E27FC236}">
+                <a16:creationId xmlns:a16="http://schemas.microsoft.com/office/drawing/2014/main" id="{C3AE5BED-03CD-F7EC-660C-3117ADA9F5D5}"/>
+              </a:ext>
+            </a:extLst>
+          </p:cNvPr>
           <p:cNvSpPr>
             <a:spLocks noGrp="1"/>
           </p:cNvSpPr>
@@ -952,16 +574,21 @@
           <a:lstStyle/>
           <a:p>
             <a:r>
-              <a:rPr lang="en-GB"/>
+              <a:rPr lang="en-US"/>
               <a:t>Click to edit Master title style</a:t>
             </a:r>
-            <a:endParaRPr lang="en-US" dirty="0"/>
-          </a:p>
-        </p:txBody>
-      </p:sp>
-      <p:sp>
-        <p:nvSpPr>
-          <p:cNvPr id="3" name="Vertical Text Placeholder 2"/>
+          </a:p>
+        </p:txBody>
+      </p:sp>
+      <p:sp>
+        <p:nvSpPr>
+          <p:cNvPr id="3" name="Vertical Text Placeholder 2">
+            <a:extLst>
+              <a:ext uri="{FF2B5EF4-FFF2-40B4-BE49-F238E27FC236}">
+                <a16:creationId xmlns:a16="http://schemas.microsoft.com/office/drawing/2014/main" id="{7A1E9B6E-2BED-29AB-83CD-B38E908076E2}"/>
+              </a:ext>
+            </a:extLst>
+          </p:cNvPr>
           <p:cNvSpPr>
             <a:spLocks noGrp="1"/>
           </p:cNvSpPr>
@@ -981,44 +608,49 @@
           <a:p>
             <a:pPr lvl="0"/>
             <a:r>
-              <a:rPr lang="en-GB"/>
+              <a:rPr lang="en-US"/>
               <a:t>Click to edit Master text styles</a:t>
             </a:r>
           </a:p>
           <a:p>
             <a:pPr lvl="1"/>
             <a:r>
-              <a:rPr lang="en-GB"/>
+              <a:rPr lang="en-US"/>
               <a:t>Second level</a:t>
             </a:r>
           </a:p>
           <a:p>
             <a:pPr lvl="2"/>
             <a:r>
-              <a:rPr lang="en-GB"/>
+              <a:rPr lang="en-US"/>
               <a:t>Third level</a:t>
             </a:r>
           </a:p>
           <a:p>
             <a:pPr lvl="3"/>
             <a:r>
-              <a:rPr lang="en-GB"/>
+              <a:rPr lang="en-US"/>
               <a:t>Fourth level</a:t>
             </a:r>
           </a:p>
           <a:p>
             <a:pPr lvl="4"/>
             <a:r>
-              <a:rPr lang="en-GB"/>
+              <a:rPr lang="en-US"/>
               <a:t>Fifth level</a:t>
             </a:r>
-            <a:endParaRPr lang="en-US" dirty="0"/>
-          </a:p>
-        </p:txBody>
-      </p:sp>
-      <p:sp>
-        <p:nvSpPr>
-          <p:cNvPr id="4" name="Date Placeholder 3"/>
+          </a:p>
+        </p:txBody>
+      </p:sp>
+      <p:sp>
+        <p:nvSpPr>
+          <p:cNvPr id="4" name="Date Placeholder 3">
+            <a:extLst>
+              <a:ext uri="{FF2B5EF4-FFF2-40B4-BE49-F238E27FC236}">
+                <a16:creationId xmlns:a16="http://schemas.microsoft.com/office/drawing/2014/main" id="{4B64E837-BB71-04D7-1913-5F8169BD04DE}"/>
+              </a:ext>
+            </a:extLst>
+          </p:cNvPr>
           <p:cNvSpPr>
             <a:spLocks noGrp="1"/>
           </p:cNvSpPr>
@@ -1031,9 +663,9 @@
           <a:bodyPr/>
           <a:lstStyle/>
           <a:p>
-            <a:fld id="{F6606698-BDAE-417D-A65D-A2C440CD0FC2}" type="datetimeFigureOut">
+            <a:fld id="{C32AD3BE-FDB2-4E6E-AF52-0FC17BD47529}" type="datetimeFigureOut">
               <a:rPr lang="en-US" smtClean="0"/>
-              <a:t>10/15/2022</a:t>
+              <a:t>10/16/2022</a:t>
             </a:fld>
             <a:endParaRPr lang="en-US"/>
           </a:p>
@@ -1041,7 +673,13 @@
       </p:sp>
       <p:sp>
         <p:nvSpPr>
-          <p:cNvPr id="5" name="Footer Placeholder 4"/>
+          <p:cNvPr id="5" name="Footer Placeholder 4">
+            <a:extLst>
+              <a:ext uri="{FF2B5EF4-FFF2-40B4-BE49-F238E27FC236}">
+                <a16:creationId xmlns:a16="http://schemas.microsoft.com/office/drawing/2014/main" id="{2FE0456C-43DD-7655-2F59-4EA54B7B2C98}"/>
+              </a:ext>
+            </a:extLst>
+          </p:cNvPr>
           <p:cNvSpPr>
             <a:spLocks noGrp="1"/>
           </p:cNvSpPr>
@@ -1060,7 +698,13 @@
       </p:sp>
       <p:sp>
         <p:nvSpPr>
-          <p:cNvPr id="6" name="Slide Number Placeholder 5"/>
+          <p:cNvPr id="6" name="Slide Number Placeholder 5">
+            <a:extLst>
+              <a:ext uri="{FF2B5EF4-FFF2-40B4-BE49-F238E27FC236}">
+                <a16:creationId xmlns:a16="http://schemas.microsoft.com/office/drawing/2014/main" id="{6592D221-F849-D74E-956C-39461C9A055B}"/>
+              </a:ext>
+            </a:extLst>
+          </p:cNvPr>
           <p:cNvSpPr>
             <a:spLocks noGrp="1"/>
           </p:cNvSpPr>
@@ -1073,7 +717,7 @@
           <a:bodyPr/>
           <a:lstStyle/>
           <a:p>
-            <a:fld id="{B8D60ABD-1DB8-4EBF-9803-33819397B5FC}" type="slidenum">
+            <a:fld id="{A849C772-AF0D-43AD-ADF6-6468DBE82806}" type="slidenum">
               <a:rPr lang="en-US" smtClean="0"/>
               <a:t>‹#›</a:t>
             </a:fld>
@@ -1084,7 +728,7 @@
     </p:spTree>
     <p:extLst>
       <p:ext uri="{BB962C8B-B14F-4D97-AF65-F5344CB8AC3E}">
-        <p14:creationId xmlns:p14="http://schemas.microsoft.com/office/powerpoint/2010/main" val="1247855619"/>
+        <p14:creationId xmlns:p14="http://schemas.microsoft.com/office/powerpoint/2010/main" val="1333928291"/>
       </p:ext>
     </p:extLst>
   </p:cSld>
@@ -1113,7 +757,13 @@
       </p:grpSpPr>
       <p:sp>
         <p:nvSpPr>
-          <p:cNvPr id="2" name="Title 1"/>
+          <p:cNvPr id="2" name="Title 1">
+            <a:extLst>
+              <a:ext uri="{FF2B5EF4-FFF2-40B4-BE49-F238E27FC236}">
+                <a16:creationId xmlns:a16="http://schemas.microsoft.com/office/drawing/2014/main" id="{F7FE2587-D9AE-1ABC-767B-AFE4B60B4F81}"/>
+              </a:ext>
+            </a:extLst>
+          </p:cNvPr>
           <p:cNvSpPr>
             <a:spLocks noGrp="1"/>
           </p:cNvSpPr>
@@ -1127,16 +777,21 @@
           <a:lstStyle/>
           <a:p>
             <a:r>
-              <a:rPr lang="en-GB"/>
+              <a:rPr lang="en-US"/>
               <a:t>Click to edit Master title style</a:t>
             </a:r>
-            <a:endParaRPr lang="en-US" dirty="0"/>
-          </a:p>
-        </p:txBody>
-      </p:sp>
-      <p:sp>
-        <p:nvSpPr>
-          <p:cNvPr id="3" name="Content Placeholder 2"/>
+          </a:p>
+        </p:txBody>
+      </p:sp>
+      <p:sp>
+        <p:nvSpPr>
+          <p:cNvPr id="3" name="Content Placeholder 2">
+            <a:extLst>
+              <a:ext uri="{FF2B5EF4-FFF2-40B4-BE49-F238E27FC236}">
+                <a16:creationId xmlns:a16="http://schemas.microsoft.com/office/drawing/2014/main" id="{F19AAECB-6534-0E9A-A87F-390F02913496}"/>
+              </a:ext>
+            </a:extLst>
+          </p:cNvPr>
           <p:cNvSpPr>
             <a:spLocks noGrp="1"/>
           </p:cNvSpPr>
@@ -1151,44 +806,49 @@
           <a:p>
             <a:pPr lvl="0"/>
             <a:r>
-              <a:rPr lang="en-GB"/>
+              <a:rPr lang="en-US"/>
               <a:t>Click to edit Master text styles</a:t>
             </a:r>
           </a:p>
           <a:p>
             <a:pPr lvl="1"/>
             <a:r>
-              <a:rPr lang="en-GB"/>
+              <a:rPr lang="en-US"/>
               <a:t>Second level</a:t>
             </a:r>
           </a:p>
           <a:p>
             <a:pPr lvl="2"/>
             <a:r>
-              <a:rPr lang="en-GB"/>
+              <a:rPr lang="en-US"/>
               <a:t>Third level</a:t>
             </a:r>
           </a:p>
           <a:p>
             <a:pPr lvl="3"/>
             <a:r>
-              <a:rPr lang="en-GB"/>
+              <a:rPr lang="en-US"/>
               <a:t>Fourth level</a:t>
             </a:r>
           </a:p>
           <a:p>
             <a:pPr lvl="4"/>
             <a:r>
-              <a:rPr lang="en-GB"/>
+              <a:rPr lang="en-US"/>
               <a:t>Fifth level</a:t>
             </a:r>
-            <a:endParaRPr lang="en-US" dirty="0"/>
-          </a:p>
-        </p:txBody>
-      </p:sp>
-      <p:sp>
-        <p:nvSpPr>
-          <p:cNvPr id="4" name="Date Placeholder 3"/>
+          </a:p>
+        </p:txBody>
+      </p:sp>
+      <p:sp>
+        <p:nvSpPr>
+          <p:cNvPr id="4" name="Date Placeholder 3">
+            <a:extLst>
+              <a:ext uri="{FF2B5EF4-FFF2-40B4-BE49-F238E27FC236}">
+                <a16:creationId xmlns:a16="http://schemas.microsoft.com/office/drawing/2014/main" id="{C46696CD-ACDF-F944-51D3-C2A2BF0D8433}"/>
+              </a:ext>
+            </a:extLst>
+          </p:cNvPr>
           <p:cNvSpPr>
             <a:spLocks noGrp="1"/>
           </p:cNvSpPr>
@@ -1201,9 +861,9 @@
           <a:bodyPr/>
           <a:lstStyle/>
           <a:p>
-            <a:fld id="{F6606698-BDAE-417D-A65D-A2C440CD0FC2}" type="datetimeFigureOut">
+            <a:fld id="{C32AD3BE-FDB2-4E6E-AF52-0FC17BD47529}" type="datetimeFigureOut">
               <a:rPr lang="en-US" smtClean="0"/>
-              <a:t>10/15/2022</a:t>
+              <a:t>10/16/2022</a:t>
             </a:fld>
             <a:endParaRPr lang="en-US"/>
           </a:p>
@@ -1211,7 +871,13 @@
       </p:sp>
       <p:sp>
         <p:nvSpPr>
-          <p:cNvPr id="5" name="Footer Placeholder 4"/>
+          <p:cNvPr id="5" name="Footer Placeholder 4">
+            <a:extLst>
+              <a:ext uri="{FF2B5EF4-FFF2-40B4-BE49-F238E27FC236}">
+                <a16:creationId xmlns:a16="http://schemas.microsoft.com/office/drawing/2014/main" id="{EDCB7BA3-94ED-8412-422F-A4618512DC6D}"/>
+              </a:ext>
+            </a:extLst>
+          </p:cNvPr>
           <p:cNvSpPr>
             <a:spLocks noGrp="1"/>
           </p:cNvSpPr>
@@ -1230,7 +896,13 @@
       </p:sp>
       <p:sp>
         <p:nvSpPr>
-          <p:cNvPr id="6" name="Slide Number Placeholder 5"/>
+          <p:cNvPr id="6" name="Slide Number Placeholder 5">
+            <a:extLst>
+              <a:ext uri="{FF2B5EF4-FFF2-40B4-BE49-F238E27FC236}">
+                <a16:creationId xmlns:a16="http://schemas.microsoft.com/office/drawing/2014/main" id="{CAD66782-BFB8-E037-0AE8-29B6D9848AB3}"/>
+              </a:ext>
+            </a:extLst>
+          </p:cNvPr>
           <p:cNvSpPr>
             <a:spLocks noGrp="1"/>
           </p:cNvSpPr>
@@ -1243,7 +915,7 @@
           <a:bodyPr/>
           <a:lstStyle/>
           <a:p>
-            <a:fld id="{B8D60ABD-1DB8-4EBF-9803-33819397B5FC}" type="slidenum">
+            <a:fld id="{A849C772-AF0D-43AD-ADF6-6468DBE82806}" type="slidenum">
               <a:rPr lang="en-US" smtClean="0"/>
               <a:t>‹#›</a:t>
             </a:fld>
@@ -1254,7 +926,7 @@
     </p:spTree>
     <p:extLst>
       <p:ext uri="{BB962C8B-B14F-4D97-AF65-F5344CB8AC3E}">
-        <p14:creationId xmlns:p14="http://schemas.microsoft.com/office/powerpoint/2010/main" val="926981939"/>
+        <p14:creationId xmlns:p14="http://schemas.microsoft.com/office/powerpoint/2010/main" val="3849913474"/>
       </p:ext>
     </p:extLst>
   </p:cSld>
@@ -1283,7 +955,13 @@
       </p:grpSpPr>
       <p:sp>
         <p:nvSpPr>
-          <p:cNvPr id="2" name="Title 1"/>
+          <p:cNvPr id="2" name="Title 1">
+            <a:extLst>
+              <a:ext uri="{FF2B5EF4-FFF2-40B4-BE49-F238E27FC236}">
+                <a16:creationId xmlns:a16="http://schemas.microsoft.com/office/drawing/2014/main" id="{75C9FA29-7A69-FE4C-CE79-FECDF48C8B74}"/>
+              </a:ext>
+            </a:extLst>
+          </p:cNvPr>
           <p:cNvSpPr>
             <a:spLocks noGrp="1"/>
           </p:cNvSpPr>
@@ -1306,16 +984,21 @@
           </a:lstStyle>
           <a:p>
             <a:r>
-              <a:rPr lang="en-GB"/>
+              <a:rPr lang="en-US"/>
               <a:t>Click to edit Master title style</a:t>
             </a:r>
-            <a:endParaRPr lang="en-US" dirty="0"/>
-          </a:p>
-        </p:txBody>
-      </p:sp>
-      <p:sp>
-        <p:nvSpPr>
-          <p:cNvPr id="3" name="Text Placeholder 2"/>
+          </a:p>
+        </p:txBody>
+      </p:sp>
+      <p:sp>
+        <p:nvSpPr>
+          <p:cNvPr id="3" name="Text Placeholder 2">
+            <a:extLst>
+              <a:ext uri="{FF2B5EF4-FFF2-40B4-BE49-F238E27FC236}">
+                <a16:creationId xmlns:a16="http://schemas.microsoft.com/office/drawing/2014/main" id="{476961BA-8977-D1BA-646B-F26F3A95B406}"/>
+              </a:ext>
+            </a:extLst>
+          </p:cNvPr>
           <p:cNvSpPr>
             <a:spLocks noGrp="1"/>
           </p:cNvSpPr>
@@ -1426,7 +1109,7 @@
           <a:p>
             <a:pPr lvl="0"/>
             <a:r>
-              <a:rPr lang="en-GB"/>
+              <a:rPr lang="en-US"/>
               <a:t>Click to edit Master text styles</a:t>
             </a:r>
           </a:p>
@@ -1434,7 +1117,13 @@
       </p:sp>
       <p:sp>
         <p:nvSpPr>
-          <p:cNvPr id="4" name="Date Placeholder 3"/>
+          <p:cNvPr id="4" name="Date Placeholder 3">
+            <a:extLst>
+              <a:ext uri="{FF2B5EF4-FFF2-40B4-BE49-F238E27FC236}">
+                <a16:creationId xmlns:a16="http://schemas.microsoft.com/office/drawing/2014/main" id="{B7624344-C814-2CAE-64E1-7D241416E942}"/>
+              </a:ext>
+            </a:extLst>
+          </p:cNvPr>
           <p:cNvSpPr>
             <a:spLocks noGrp="1"/>
           </p:cNvSpPr>
@@ -1447,9 +1136,9 @@
           <a:bodyPr/>
           <a:lstStyle/>
           <a:p>
-            <a:fld id="{F6606698-BDAE-417D-A65D-A2C440CD0FC2}" type="datetimeFigureOut">
+            <a:fld id="{C32AD3BE-FDB2-4E6E-AF52-0FC17BD47529}" type="datetimeFigureOut">
               <a:rPr lang="en-US" smtClean="0"/>
-              <a:t>10/15/2022</a:t>
+              <a:t>10/16/2022</a:t>
             </a:fld>
             <a:endParaRPr lang="en-US"/>
           </a:p>
@@ -1457,7 +1146,13 @@
       </p:sp>
       <p:sp>
         <p:nvSpPr>
-          <p:cNvPr id="5" name="Footer Placeholder 4"/>
+          <p:cNvPr id="5" name="Footer Placeholder 4">
+            <a:extLst>
+              <a:ext uri="{FF2B5EF4-FFF2-40B4-BE49-F238E27FC236}">
+                <a16:creationId xmlns:a16="http://schemas.microsoft.com/office/drawing/2014/main" id="{D798D60F-7E2B-91FD-957F-753B460C3483}"/>
+              </a:ext>
+            </a:extLst>
+          </p:cNvPr>
           <p:cNvSpPr>
             <a:spLocks noGrp="1"/>
           </p:cNvSpPr>
@@ -1476,7 +1171,13 @@
       </p:sp>
       <p:sp>
         <p:nvSpPr>
-          <p:cNvPr id="6" name="Slide Number Placeholder 5"/>
+          <p:cNvPr id="6" name="Slide Number Placeholder 5">
+            <a:extLst>
+              <a:ext uri="{FF2B5EF4-FFF2-40B4-BE49-F238E27FC236}">
+                <a16:creationId xmlns:a16="http://schemas.microsoft.com/office/drawing/2014/main" id="{E5559417-C176-E03D-2DE6-98D9D48AD61B}"/>
+              </a:ext>
+            </a:extLst>
+          </p:cNvPr>
           <p:cNvSpPr>
             <a:spLocks noGrp="1"/>
           </p:cNvSpPr>
@@ -1489,7 +1190,7 @@
           <a:bodyPr/>
           <a:lstStyle/>
           <a:p>
-            <a:fld id="{B8D60ABD-1DB8-4EBF-9803-33819397B5FC}" type="slidenum">
+            <a:fld id="{A849C772-AF0D-43AD-ADF6-6468DBE82806}" type="slidenum">
               <a:rPr lang="en-US" smtClean="0"/>
               <a:t>‹#›</a:t>
             </a:fld>
@@ -1500,7 +1201,7 @@
     </p:spTree>
     <p:extLst>
       <p:ext uri="{BB962C8B-B14F-4D97-AF65-F5344CB8AC3E}">
-        <p14:creationId xmlns:p14="http://schemas.microsoft.com/office/powerpoint/2010/main" val="1337533991"/>
+        <p14:creationId xmlns:p14="http://schemas.microsoft.com/office/powerpoint/2010/main" val="2798197824"/>
       </p:ext>
     </p:extLst>
   </p:cSld>
@@ -1529,7 +1230,13 @@
       </p:grpSpPr>
       <p:sp>
         <p:nvSpPr>
-          <p:cNvPr id="2" name="Title 1"/>
+          <p:cNvPr id="2" name="Title 1">
+            <a:extLst>
+              <a:ext uri="{FF2B5EF4-FFF2-40B4-BE49-F238E27FC236}">
+                <a16:creationId xmlns:a16="http://schemas.microsoft.com/office/drawing/2014/main" id="{A062BBEA-ECFA-0FE8-B801-736A5323D8A3}"/>
+              </a:ext>
+            </a:extLst>
+          </p:cNvPr>
           <p:cNvSpPr>
             <a:spLocks noGrp="1"/>
           </p:cNvSpPr>
@@ -1543,16 +1250,21 @@
           <a:lstStyle/>
           <a:p>
             <a:r>
-              <a:rPr lang="en-GB"/>
+              <a:rPr lang="en-US"/>
               <a:t>Click to edit Master title style</a:t>
             </a:r>
-            <a:endParaRPr lang="en-US" dirty="0"/>
-          </a:p>
-        </p:txBody>
-      </p:sp>
-      <p:sp>
-        <p:nvSpPr>
-          <p:cNvPr id="3" name="Content Placeholder 2"/>
+          </a:p>
+        </p:txBody>
+      </p:sp>
+      <p:sp>
+        <p:nvSpPr>
+          <p:cNvPr id="3" name="Content Placeholder 2">
+            <a:extLst>
+              <a:ext uri="{FF2B5EF4-FFF2-40B4-BE49-F238E27FC236}">
+                <a16:creationId xmlns:a16="http://schemas.microsoft.com/office/drawing/2014/main" id="{EF372D96-307A-EADF-CD56-EB1B7A7F2173}"/>
+              </a:ext>
+            </a:extLst>
+          </p:cNvPr>
           <p:cNvSpPr>
             <a:spLocks noGrp="1"/>
           </p:cNvSpPr>
@@ -1572,44 +1284,49 @@
           <a:p>
             <a:pPr lvl="0"/>
             <a:r>
-              <a:rPr lang="en-GB"/>
+              <a:rPr lang="en-US"/>
               <a:t>Click to edit Master text styles</a:t>
             </a:r>
           </a:p>
           <a:p>
             <a:pPr lvl="1"/>
             <a:r>
-              <a:rPr lang="en-GB"/>
+              <a:rPr lang="en-US"/>
               <a:t>Second level</a:t>
             </a:r>
           </a:p>
           <a:p>
             <a:pPr lvl="2"/>
             <a:r>
-              <a:rPr lang="en-GB"/>
+              <a:rPr lang="en-US"/>
               <a:t>Third level</a:t>
             </a:r>
           </a:p>
           <a:p>
             <a:pPr lvl="3"/>
             <a:r>
-              <a:rPr lang="en-GB"/>
+              <a:rPr lang="en-US"/>
               <a:t>Fourth level</a:t>
             </a:r>
           </a:p>
           <a:p>
             <a:pPr lvl="4"/>
             <a:r>
-              <a:rPr lang="en-GB"/>
+              <a:rPr lang="en-US"/>
               <a:t>Fifth level</a:t>
             </a:r>
-            <a:endParaRPr lang="en-US" dirty="0"/>
-          </a:p>
-        </p:txBody>
-      </p:sp>
-      <p:sp>
-        <p:nvSpPr>
-          <p:cNvPr id="4" name="Content Placeholder 3"/>
+          </a:p>
+        </p:txBody>
+      </p:sp>
+      <p:sp>
+        <p:nvSpPr>
+          <p:cNvPr id="4" name="Content Placeholder 3">
+            <a:extLst>
+              <a:ext uri="{FF2B5EF4-FFF2-40B4-BE49-F238E27FC236}">
+                <a16:creationId xmlns:a16="http://schemas.microsoft.com/office/drawing/2014/main" id="{E7B54A75-E5F2-A7BE-FD17-A555F3A7D815}"/>
+              </a:ext>
+            </a:extLst>
+          </p:cNvPr>
           <p:cNvSpPr>
             <a:spLocks noGrp="1"/>
           </p:cNvSpPr>
@@ -1629,44 +1346,49 @@
           <a:p>
             <a:pPr lvl="0"/>
             <a:r>
-              <a:rPr lang="en-GB"/>
+              <a:rPr lang="en-US"/>
               <a:t>Click to edit Master text styles</a:t>
             </a:r>
           </a:p>
           <a:p>
             <a:pPr lvl="1"/>
             <a:r>
-              <a:rPr lang="en-GB"/>
+              <a:rPr lang="en-US"/>
               <a:t>Second level</a:t>
             </a:r>
           </a:p>
           <a:p>
             <a:pPr lvl="2"/>
             <a:r>
-              <a:rPr lang="en-GB"/>
+              <a:rPr lang="en-US"/>
               <a:t>Third level</a:t>
             </a:r>
           </a:p>
           <a:p>
             <a:pPr lvl="3"/>
             <a:r>
-              <a:rPr lang="en-GB"/>
+              <a:rPr lang="en-US"/>
               <a:t>Fourth level</a:t>
             </a:r>
           </a:p>
           <a:p>
             <a:pPr lvl="4"/>
             <a:r>
-              <a:rPr lang="en-GB"/>
+              <a:rPr lang="en-US"/>
               <a:t>Fifth level</a:t>
             </a:r>
-            <a:endParaRPr lang="en-US" dirty="0"/>
-          </a:p>
-        </p:txBody>
-      </p:sp>
-      <p:sp>
-        <p:nvSpPr>
-          <p:cNvPr id="5" name="Date Placeholder 4"/>
+          </a:p>
+        </p:txBody>
+      </p:sp>
+      <p:sp>
+        <p:nvSpPr>
+          <p:cNvPr id="5" name="Date Placeholder 4">
+            <a:extLst>
+              <a:ext uri="{FF2B5EF4-FFF2-40B4-BE49-F238E27FC236}">
+                <a16:creationId xmlns:a16="http://schemas.microsoft.com/office/drawing/2014/main" id="{2FFA3C54-674E-7137-18BF-0080B37BE16B}"/>
+              </a:ext>
+            </a:extLst>
+          </p:cNvPr>
           <p:cNvSpPr>
             <a:spLocks noGrp="1"/>
           </p:cNvSpPr>
@@ -1679,9 +1401,9 @@
           <a:bodyPr/>
           <a:lstStyle/>
           <a:p>
-            <a:fld id="{F6606698-BDAE-417D-A65D-A2C440CD0FC2}" type="datetimeFigureOut">
+            <a:fld id="{C32AD3BE-FDB2-4E6E-AF52-0FC17BD47529}" type="datetimeFigureOut">
               <a:rPr lang="en-US" smtClean="0"/>
-              <a:t>10/15/2022</a:t>
+              <a:t>10/16/2022</a:t>
             </a:fld>
             <a:endParaRPr lang="en-US"/>
           </a:p>
@@ -1689,7 +1411,13 @@
       </p:sp>
       <p:sp>
         <p:nvSpPr>
-          <p:cNvPr id="6" name="Footer Placeholder 5"/>
+          <p:cNvPr id="6" name="Footer Placeholder 5">
+            <a:extLst>
+              <a:ext uri="{FF2B5EF4-FFF2-40B4-BE49-F238E27FC236}">
+                <a16:creationId xmlns:a16="http://schemas.microsoft.com/office/drawing/2014/main" id="{0DF24938-645E-44AD-0757-394366B618DB}"/>
+              </a:ext>
+            </a:extLst>
+          </p:cNvPr>
           <p:cNvSpPr>
             <a:spLocks noGrp="1"/>
           </p:cNvSpPr>
@@ -1708,7 +1436,13 @@
       </p:sp>
       <p:sp>
         <p:nvSpPr>
-          <p:cNvPr id="7" name="Slide Number Placeholder 6"/>
+          <p:cNvPr id="7" name="Slide Number Placeholder 6">
+            <a:extLst>
+              <a:ext uri="{FF2B5EF4-FFF2-40B4-BE49-F238E27FC236}">
+                <a16:creationId xmlns:a16="http://schemas.microsoft.com/office/drawing/2014/main" id="{497904B9-B4DE-CC1E-3792-67C4DF214D2B}"/>
+              </a:ext>
+            </a:extLst>
+          </p:cNvPr>
           <p:cNvSpPr>
             <a:spLocks noGrp="1"/>
           </p:cNvSpPr>
@@ -1721,7 +1455,7 @@
           <a:bodyPr/>
           <a:lstStyle/>
           <a:p>
-            <a:fld id="{B8D60ABD-1DB8-4EBF-9803-33819397B5FC}" type="slidenum">
+            <a:fld id="{A849C772-AF0D-43AD-ADF6-6468DBE82806}" type="slidenum">
               <a:rPr lang="en-US" smtClean="0"/>
               <a:t>‹#›</a:t>
             </a:fld>
@@ -1732,7 +1466,7 @@
     </p:spTree>
     <p:extLst>
       <p:ext uri="{BB962C8B-B14F-4D97-AF65-F5344CB8AC3E}">
-        <p14:creationId xmlns:p14="http://schemas.microsoft.com/office/powerpoint/2010/main" val="2526753033"/>
+        <p14:creationId xmlns:p14="http://schemas.microsoft.com/office/powerpoint/2010/main" val="4121330993"/>
       </p:ext>
     </p:extLst>
   </p:cSld>
@@ -1761,7 +1495,13 @@
       </p:grpSpPr>
       <p:sp>
         <p:nvSpPr>
-          <p:cNvPr id="2" name="Title 1"/>
+          <p:cNvPr id="2" name="Title 1">
+            <a:extLst>
+              <a:ext uri="{FF2B5EF4-FFF2-40B4-BE49-F238E27FC236}">
+                <a16:creationId xmlns:a16="http://schemas.microsoft.com/office/drawing/2014/main" id="{46E6C931-B261-20F6-D699-D05FD9663C26}"/>
+              </a:ext>
+            </a:extLst>
+          </p:cNvPr>
           <p:cNvSpPr>
             <a:spLocks noGrp="1"/>
           </p:cNvSpPr>
@@ -1780,16 +1520,21 @@
           <a:lstStyle/>
           <a:p>
             <a:r>
-              <a:rPr lang="en-GB"/>
+              <a:rPr lang="en-US"/>
               <a:t>Click to edit Master title style</a:t>
             </a:r>
-            <a:endParaRPr lang="en-US" dirty="0"/>
-          </a:p>
-        </p:txBody>
-      </p:sp>
-      <p:sp>
-        <p:nvSpPr>
-          <p:cNvPr id="3" name="Text Placeholder 2"/>
+          </a:p>
+        </p:txBody>
+      </p:sp>
+      <p:sp>
+        <p:nvSpPr>
+          <p:cNvPr id="3" name="Text Placeholder 2">
+            <a:extLst>
+              <a:ext uri="{FF2B5EF4-FFF2-40B4-BE49-F238E27FC236}">
+                <a16:creationId xmlns:a16="http://schemas.microsoft.com/office/drawing/2014/main" id="{A2B4EF52-3DEA-E297-DC70-65DCA0CEC319}"/>
+              </a:ext>
+            </a:extLst>
+          </p:cNvPr>
           <p:cNvSpPr>
             <a:spLocks noGrp="1"/>
           </p:cNvSpPr>
@@ -1846,7 +1591,7 @@
           <a:p>
             <a:pPr lvl="0"/>
             <a:r>
-              <a:rPr lang="en-GB"/>
+              <a:rPr lang="en-US"/>
               <a:t>Click to edit Master text styles</a:t>
             </a:r>
           </a:p>
@@ -1854,7 +1599,13 @@
       </p:sp>
       <p:sp>
         <p:nvSpPr>
-          <p:cNvPr id="4" name="Content Placeholder 3"/>
+          <p:cNvPr id="4" name="Content Placeholder 3">
+            <a:extLst>
+              <a:ext uri="{FF2B5EF4-FFF2-40B4-BE49-F238E27FC236}">
+                <a16:creationId xmlns:a16="http://schemas.microsoft.com/office/drawing/2014/main" id="{D690AF58-07B3-BA05-26B4-452491ED4816}"/>
+              </a:ext>
+            </a:extLst>
+          </p:cNvPr>
           <p:cNvSpPr>
             <a:spLocks noGrp="1"/>
           </p:cNvSpPr>
@@ -1874,44 +1625,49 @@
           <a:p>
             <a:pPr lvl="0"/>
             <a:r>
-              <a:rPr lang="en-GB"/>
+              <a:rPr lang="en-US"/>
               <a:t>Click to edit Master text styles</a:t>
             </a:r>
           </a:p>
           <a:p>
             <a:pPr lvl="1"/>
             <a:r>
-              <a:rPr lang="en-GB"/>
+              <a:rPr lang="en-US"/>
               <a:t>Second level</a:t>
             </a:r>
           </a:p>
           <a:p>
             <a:pPr lvl="2"/>
             <a:r>
-              <a:rPr lang="en-GB"/>
+              <a:rPr lang="en-US"/>
               <a:t>Third level</a:t>
             </a:r>
           </a:p>
           <a:p>
             <a:pPr lvl="3"/>
             <a:r>
-              <a:rPr lang="en-GB"/>
+              <a:rPr lang="en-US"/>
               <a:t>Fourth level</a:t>
             </a:r>
           </a:p>
           <a:p>
             <a:pPr lvl="4"/>
             <a:r>
-              <a:rPr lang="en-GB"/>
+              <a:rPr lang="en-US"/>
               <a:t>Fifth level</a:t>
             </a:r>
-            <a:endParaRPr lang="en-US" dirty="0"/>
-          </a:p>
-        </p:txBody>
-      </p:sp>
-      <p:sp>
-        <p:nvSpPr>
-          <p:cNvPr id="5" name="Text Placeholder 4"/>
+          </a:p>
+        </p:txBody>
+      </p:sp>
+      <p:sp>
+        <p:nvSpPr>
+          <p:cNvPr id="5" name="Text Placeholder 4">
+            <a:extLst>
+              <a:ext uri="{FF2B5EF4-FFF2-40B4-BE49-F238E27FC236}">
+                <a16:creationId xmlns:a16="http://schemas.microsoft.com/office/drawing/2014/main" id="{968074FD-8B1A-41C3-9538-CC6ADB45521D}"/>
+              </a:ext>
+            </a:extLst>
+          </p:cNvPr>
           <p:cNvSpPr>
             <a:spLocks noGrp="1"/>
           </p:cNvSpPr>
@@ -1968,7 +1724,7 @@
           <a:p>
             <a:pPr lvl="0"/>
             <a:r>
-              <a:rPr lang="en-GB"/>
+              <a:rPr lang="en-US"/>
               <a:t>Click to edit Master text styles</a:t>
             </a:r>
           </a:p>
@@ -1976,7 +1732,13 @@
       </p:sp>
       <p:sp>
         <p:nvSpPr>
-          <p:cNvPr id="6" name="Content Placeholder 5"/>
+          <p:cNvPr id="6" name="Content Placeholder 5">
+            <a:extLst>
+              <a:ext uri="{FF2B5EF4-FFF2-40B4-BE49-F238E27FC236}">
+                <a16:creationId xmlns:a16="http://schemas.microsoft.com/office/drawing/2014/main" id="{8A1D3782-55B0-C939-0D6C-3F623F102AC9}"/>
+              </a:ext>
+            </a:extLst>
+          </p:cNvPr>
           <p:cNvSpPr>
             <a:spLocks noGrp="1"/>
           </p:cNvSpPr>
@@ -1996,44 +1758,49 @@
           <a:p>
             <a:pPr lvl="0"/>
             <a:r>
-              <a:rPr lang="en-GB"/>
+              <a:rPr lang="en-US"/>
               <a:t>Click to edit Master text styles</a:t>
             </a:r>
           </a:p>
           <a:p>
             <a:pPr lvl="1"/>
             <a:r>
-              <a:rPr lang="en-GB"/>
+              <a:rPr lang="en-US"/>
               <a:t>Second level</a:t>
             </a:r>
           </a:p>
           <a:p>
             <a:pPr lvl="2"/>
             <a:r>
-              <a:rPr lang="en-GB"/>
+              <a:rPr lang="en-US"/>
               <a:t>Third level</a:t>
             </a:r>
           </a:p>
           <a:p>
             <a:pPr lvl="3"/>
             <a:r>
-              <a:rPr lang="en-GB"/>
+              <a:rPr lang="en-US"/>
               <a:t>Fourth level</a:t>
             </a:r>
           </a:p>
           <a:p>
             <a:pPr lvl="4"/>
             <a:r>
-              <a:rPr lang="en-GB"/>
+              <a:rPr lang="en-US"/>
               <a:t>Fifth level</a:t>
             </a:r>
-            <a:endParaRPr lang="en-US" dirty="0"/>
-          </a:p>
-        </p:txBody>
-      </p:sp>
-      <p:sp>
-        <p:nvSpPr>
-          <p:cNvPr id="7" name="Date Placeholder 6"/>
+          </a:p>
+        </p:txBody>
+      </p:sp>
+      <p:sp>
+        <p:nvSpPr>
+          <p:cNvPr id="7" name="Date Placeholder 6">
+            <a:extLst>
+              <a:ext uri="{FF2B5EF4-FFF2-40B4-BE49-F238E27FC236}">
+                <a16:creationId xmlns:a16="http://schemas.microsoft.com/office/drawing/2014/main" id="{5285E9AF-1988-6834-217D-BE7F32123012}"/>
+              </a:ext>
+            </a:extLst>
+          </p:cNvPr>
           <p:cNvSpPr>
             <a:spLocks noGrp="1"/>
           </p:cNvSpPr>
@@ -2046,9 +1813,9 @@
           <a:bodyPr/>
           <a:lstStyle/>
           <a:p>
-            <a:fld id="{F6606698-BDAE-417D-A65D-A2C440CD0FC2}" type="datetimeFigureOut">
+            <a:fld id="{C32AD3BE-FDB2-4E6E-AF52-0FC17BD47529}" type="datetimeFigureOut">
               <a:rPr lang="en-US" smtClean="0"/>
-              <a:t>10/15/2022</a:t>
+              <a:t>10/16/2022</a:t>
             </a:fld>
             <a:endParaRPr lang="en-US"/>
           </a:p>
@@ -2056,7 +1823,13 @@
       </p:sp>
       <p:sp>
         <p:nvSpPr>
-          <p:cNvPr id="8" name="Footer Placeholder 7"/>
+          <p:cNvPr id="8" name="Footer Placeholder 7">
+            <a:extLst>
+              <a:ext uri="{FF2B5EF4-FFF2-40B4-BE49-F238E27FC236}">
+                <a16:creationId xmlns:a16="http://schemas.microsoft.com/office/drawing/2014/main" id="{3EE0B7B0-CD5C-DF36-63D7-B8991E03EAC4}"/>
+              </a:ext>
+            </a:extLst>
+          </p:cNvPr>
           <p:cNvSpPr>
             <a:spLocks noGrp="1"/>
           </p:cNvSpPr>
@@ -2075,7 +1848,13 @@
       </p:sp>
       <p:sp>
         <p:nvSpPr>
-          <p:cNvPr id="9" name="Slide Number Placeholder 8"/>
+          <p:cNvPr id="9" name="Slide Number Placeholder 8">
+            <a:extLst>
+              <a:ext uri="{FF2B5EF4-FFF2-40B4-BE49-F238E27FC236}">
+                <a16:creationId xmlns:a16="http://schemas.microsoft.com/office/drawing/2014/main" id="{263CED04-BB6F-ED94-BF49-1EB241926FC9}"/>
+              </a:ext>
+            </a:extLst>
+          </p:cNvPr>
           <p:cNvSpPr>
             <a:spLocks noGrp="1"/>
           </p:cNvSpPr>
@@ -2088,7 +1867,7 @@
           <a:bodyPr/>
           <a:lstStyle/>
           <a:p>
-            <a:fld id="{B8D60ABD-1DB8-4EBF-9803-33819397B5FC}" type="slidenum">
+            <a:fld id="{A849C772-AF0D-43AD-ADF6-6468DBE82806}" type="slidenum">
               <a:rPr lang="en-US" smtClean="0"/>
               <a:t>‹#›</a:t>
             </a:fld>
@@ -2099,7 +1878,7 @@
     </p:spTree>
     <p:extLst>
       <p:ext uri="{BB962C8B-B14F-4D97-AF65-F5344CB8AC3E}">
-        <p14:creationId xmlns:p14="http://schemas.microsoft.com/office/powerpoint/2010/main" val="2473344795"/>
+        <p14:creationId xmlns:p14="http://schemas.microsoft.com/office/powerpoint/2010/main" val="719969496"/>
       </p:ext>
     </p:extLst>
   </p:cSld>
@@ -2128,7 +1907,13 @@
       </p:grpSpPr>
       <p:sp>
         <p:nvSpPr>
-          <p:cNvPr id="2" name="Title 1"/>
+          <p:cNvPr id="2" name="Title 1">
+            <a:extLst>
+              <a:ext uri="{FF2B5EF4-FFF2-40B4-BE49-F238E27FC236}">
+                <a16:creationId xmlns:a16="http://schemas.microsoft.com/office/drawing/2014/main" id="{85C20CAB-A9B0-950A-ADA7-B736C613DF42}"/>
+              </a:ext>
+            </a:extLst>
+          </p:cNvPr>
           <p:cNvSpPr>
             <a:spLocks noGrp="1"/>
           </p:cNvSpPr>
@@ -2142,16 +1927,21 @@
           <a:lstStyle/>
           <a:p>
             <a:r>
-              <a:rPr lang="en-GB"/>
+              <a:rPr lang="en-US"/>
               <a:t>Click to edit Master title style</a:t>
             </a:r>
-            <a:endParaRPr lang="en-US" dirty="0"/>
-          </a:p>
-        </p:txBody>
-      </p:sp>
-      <p:sp>
-        <p:nvSpPr>
-          <p:cNvPr id="3" name="Date Placeholder 2"/>
+          </a:p>
+        </p:txBody>
+      </p:sp>
+      <p:sp>
+        <p:nvSpPr>
+          <p:cNvPr id="3" name="Date Placeholder 2">
+            <a:extLst>
+              <a:ext uri="{FF2B5EF4-FFF2-40B4-BE49-F238E27FC236}">
+                <a16:creationId xmlns:a16="http://schemas.microsoft.com/office/drawing/2014/main" id="{48EF589A-BF88-5502-9D88-54CA23157380}"/>
+              </a:ext>
+            </a:extLst>
+          </p:cNvPr>
           <p:cNvSpPr>
             <a:spLocks noGrp="1"/>
           </p:cNvSpPr>
@@ -2164,9 +1954,9 @@
           <a:bodyPr/>
           <a:lstStyle/>
           <a:p>
-            <a:fld id="{F6606698-BDAE-417D-A65D-A2C440CD0FC2}" type="datetimeFigureOut">
+            <a:fld id="{C32AD3BE-FDB2-4E6E-AF52-0FC17BD47529}" type="datetimeFigureOut">
               <a:rPr lang="en-US" smtClean="0"/>
-              <a:t>10/15/2022</a:t>
+              <a:t>10/16/2022</a:t>
             </a:fld>
             <a:endParaRPr lang="en-US"/>
           </a:p>
@@ -2174,7 +1964,13 @@
       </p:sp>
       <p:sp>
         <p:nvSpPr>
-          <p:cNvPr id="4" name="Footer Placeholder 3"/>
+          <p:cNvPr id="4" name="Footer Placeholder 3">
+            <a:extLst>
+              <a:ext uri="{FF2B5EF4-FFF2-40B4-BE49-F238E27FC236}">
+                <a16:creationId xmlns:a16="http://schemas.microsoft.com/office/drawing/2014/main" id="{D2395A9C-4C44-FC20-3DC0-DD94D2B879D0}"/>
+              </a:ext>
+            </a:extLst>
+          </p:cNvPr>
           <p:cNvSpPr>
             <a:spLocks noGrp="1"/>
           </p:cNvSpPr>
@@ -2193,7 +1989,13 @@
       </p:sp>
       <p:sp>
         <p:nvSpPr>
-          <p:cNvPr id="5" name="Slide Number Placeholder 4"/>
+          <p:cNvPr id="5" name="Slide Number Placeholder 4">
+            <a:extLst>
+              <a:ext uri="{FF2B5EF4-FFF2-40B4-BE49-F238E27FC236}">
+                <a16:creationId xmlns:a16="http://schemas.microsoft.com/office/drawing/2014/main" id="{83D1243F-393F-BD9C-DF75-E623FE503BEB}"/>
+              </a:ext>
+            </a:extLst>
+          </p:cNvPr>
           <p:cNvSpPr>
             <a:spLocks noGrp="1"/>
           </p:cNvSpPr>
@@ -2206,7 +2008,7 @@
           <a:bodyPr/>
           <a:lstStyle/>
           <a:p>
-            <a:fld id="{B8D60ABD-1DB8-4EBF-9803-33819397B5FC}" type="slidenum">
+            <a:fld id="{A849C772-AF0D-43AD-ADF6-6468DBE82806}" type="slidenum">
               <a:rPr lang="en-US" smtClean="0"/>
               <a:t>‹#›</a:t>
             </a:fld>
@@ -2217,7 +2019,7 @@
     </p:spTree>
     <p:extLst>
       <p:ext uri="{BB962C8B-B14F-4D97-AF65-F5344CB8AC3E}">
-        <p14:creationId xmlns:p14="http://schemas.microsoft.com/office/powerpoint/2010/main" val="1082608713"/>
+        <p14:creationId xmlns:p14="http://schemas.microsoft.com/office/powerpoint/2010/main" val="302130057"/>
       </p:ext>
     </p:extLst>
   </p:cSld>
@@ -2246,7 +2048,13 @@
       </p:grpSpPr>
       <p:sp>
         <p:nvSpPr>
-          <p:cNvPr id="2" name="Date Placeholder 1"/>
+          <p:cNvPr id="2" name="Date Placeholder 1">
+            <a:extLst>
+              <a:ext uri="{FF2B5EF4-FFF2-40B4-BE49-F238E27FC236}">
+                <a16:creationId xmlns:a16="http://schemas.microsoft.com/office/drawing/2014/main" id="{3BD9C468-7A19-DA1D-3A56-917477090730}"/>
+              </a:ext>
+            </a:extLst>
+          </p:cNvPr>
           <p:cNvSpPr>
             <a:spLocks noGrp="1"/>
           </p:cNvSpPr>
@@ -2259,9 +2067,9 @@
           <a:bodyPr/>
           <a:lstStyle/>
           <a:p>
-            <a:fld id="{F6606698-BDAE-417D-A65D-A2C440CD0FC2}" type="datetimeFigureOut">
+            <a:fld id="{C32AD3BE-FDB2-4E6E-AF52-0FC17BD47529}" type="datetimeFigureOut">
               <a:rPr lang="en-US" smtClean="0"/>
-              <a:t>10/15/2022</a:t>
+              <a:t>10/16/2022</a:t>
             </a:fld>
             <a:endParaRPr lang="en-US"/>
           </a:p>
@@ -2269,7 +2077,13 @@
       </p:sp>
       <p:sp>
         <p:nvSpPr>
-          <p:cNvPr id="3" name="Footer Placeholder 2"/>
+          <p:cNvPr id="3" name="Footer Placeholder 2">
+            <a:extLst>
+              <a:ext uri="{FF2B5EF4-FFF2-40B4-BE49-F238E27FC236}">
+                <a16:creationId xmlns:a16="http://schemas.microsoft.com/office/drawing/2014/main" id="{37D2A61D-F413-2C3E-6CEB-DCA38A6EBD22}"/>
+              </a:ext>
+            </a:extLst>
+          </p:cNvPr>
           <p:cNvSpPr>
             <a:spLocks noGrp="1"/>
           </p:cNvSpPr>
@@ -2288,7 +2102,13 @@
       </p:sp>
       <p:sp>
         <p:nvSpPr>
-          <p:cNvPr id="4" name="Slide Number Placeholder 3"/>
+          <p:cNvPr id="4" name="Slide Number Placeholder 3">
+            <a:extLst>
+              <a:ext uri="{FF2B5EF4-FFF2-40B4-BE49-F238E27FC236}">
+                <a16:creationId xmlns:a16="http://schemas.microsoft.com/office/drawing/2014/main" id="{518559A5-E01F-97F9-C1AD-3AC65EADB4C0}"/>
+              </a:ext>
+            </a:extLst>
+          </p:cNvPr>
           <p:cNvSpPr>
             <a:spLocks noGrp="1"/>
           </p:cNvSpPr>
@@ -2301,7 +2121,7 @@
           <a:bodyPr/>
           <a:lstStyle/>
           <a:p>
-            <a:fld id="{B8D60ABD-1DB8-4EBF-9803-33819397B5FC}" type="slidenum">
+            <a:fld id="{A849C772-AF0D-43AD-ADF6-6468DBE82806}" type="slidenum">
               <a:rPr lang="en-US" smtClean="0"/>
               <a:t>‹#›</a:t>
             </a:fld>
@@ -2312,7 +2132,7 @@
     </p:spTree>
     <p:extLst>
       <p:ext uri="{BB962C8B-B14F-4D97-AF65-F5344CB8AC3E}">
-        <p14:creationId xmlns:p14="http://schemas.microsoft.com/office/powerpoint/2010/main" val="4195924003"/>
+        <p14:creationId xmlns:p14="http://schemas.microsoft.com/office/powerpoint/2010/main" val="202223636"/>
       </p:ext>
     </p:extLst>
   </p:cSld>
@@ -2341,7 +2161,13 @@
       </p:grpSpPr>
       <p:sp>
         <p:nvSpPr>
-          <p:cNvPr id="2" name="Title 1"/>
+          <p:cNvPr id="2" name="Title 1">
+            <a:extLst>
+              <a:ext uri="{FF2B5EF4-FFF2-40B4-BE49-F238E27FC236}">
+                <a16:creationId xmlns:a16="http://schemas.microsoft.com/office/drawing/2014/main" id="{6F669E84-AED4-3DC7-0369-7CCB637EADBB}"/>
+              </a:ext>
+            </a:extLst>
+          </p:cNvPr>
           <p:cNvSpPr>
             <a:spLocks noGrp="1"/>
           </p:cNvSpPr>
@@ -2364,16 +2190,21 @@
           </a:lstStyle>
           <a:p>
             <a:r>
-              <a:rPr lang="en-GB"/>
+              <a:rPr lang="en-US"/>
               <a:t>Click to edit Master title style</a:t>
             </a:r>
-            <a:endParaRPr lang="en-US" dirty="0"/>
-          </a:p>
-        </p:txBody>
-      </p:sp>
-      <p:sp>
-        <p:nvSpPr>
-          <p:cNvPr id="3" name="Content Placeholder 2"/>
+          </a:p>
+        </p:txBody>
+      </p:sp>
+      <p:sp>
+        <p:nvSpPr>
+          <p:cNvPr id="3" name="Content Placeholder 2">
+            <a:extLst>
+              <a:ext uri="{FF2B5EF4-FFF2-40B4-BE49-F238E27FC236}">
+                <a16:creationId xmlns:a16="http://schemas.microsoft.com/office/drawing/2014/main" id="{A540B6C2-F991-DE2C-EC81-E2697FAB4E4C}"/>
+              </a:ext>
+            </a:extLst>
+          </p:cNvPr>
           <p:cNvSpPr>
             <a:spLocks noGrp="1"/>
           </p:cNvSpPr>
@@ -2421,44 +2252,49 @@
           <a:p>
             <a:pPr lvl="0"/>
             <a:r>
-              <a:rPr lang="en-GB"/>
+              <a:rPr lang="en-US"/>
               <a:t>Click to edit Master text styles</a:t>
             </a:r>
           </a:p>
           <a:p>
             <a:pPr lvl="1"/>
             <a:r>
-              <a:rPr lang="en-GB"/>
+              <a:rPr lang="en-US"/>
               <a:t>Second level</a:t>
             </a:r>
           </a:p>
           <a:p>
             <a:pPr lvl="2"/>
             <a:r>
-              <a:rPr lang="en-GB"/>
+              <a:rPr lang="en-US"/>
               <a:t>Third level</a:t>
             </a:r>
           </a:p>
           <a:p>
             <a:pPr lvl="3"/>
             <a:r>
-              <a:rPr lang="en-GB"/>
+              <a:rPr lang="en-US"/>
               <a:t>Fourth level</a:t>
             </a:r>
           </a:p>
           <a:p>
             <a:pPr lvl="4"/>
             <a:r>
-              <a:rPr lang="en-GB"/>
+              <a:rPr lang="en-US"/>
               <a:t>Fifth level</a:t>
             </a:r>
-            <a:endParaRPr lang="en-US" dirty="0"/>
-          </a:p>
-        </p:txBody>
-      </p:sp>
-      <p:sp>
-        <p:nvSpPr>
-          <p:cNvPr id="4" name="Text Placeholder 3"/>
+          </a:p>
+        </p:txBody>
+      </p:sp>
+      <p:sp>
+        <p:nvSpPr>
+          <p:cNvPr id="4" name="Text Placeholder 3">
+            <a:extLst>
+              <a:ext uri="{FF2B5EF4-FFF2-40B4-BE49-F238E27FC236}">
+                <a16:creationId xmlns:a16="http://schemas.microsoft.com/office/drawing/2014/main" id="{109E44CB-D9E4-BD1E-4EE6-5834C9FE07A1}"/>
+              </a:ext>
+            </a:extLst>
+          </p:cNvPr>
           <p:cNvSpPr>
             <a:spLocks noGrp="1"/>
           </p:cNvSpPr>
@@ -2515,7 +2351,7 @@
           <a:p>
             <a:pPr lvl="0"/>
             <a:r>
-              <a:rPr lang="en-GB"/>
+              <a:rPr lang="en-US"/>
               <a:t>Click to edit Master text styles</a:t>
             </a:r>
           </a:p>
@@ -2523,7 +2359,13 @@
       </p:sp>
       <p:sp>
         <p:nvSpPr>
-          <p:cNvPr id="5" name="Date Placeholder 4"/>
+          <p:cNvPr id="5" name="Date Placeholder 4">
+            <a:extLst>
+              <a:ext uri="{FF2B5EF4-FFF2-40B4-BE49-F238E27FC236}">
+                <a16:creationId xmlns:a16="http://schemas.microsoft.com/office/drawing/2014/main" id="{BD0C4CDD-30F6-1929-603F-DAF0A7E8B7C8}"/>
+              </a:ext>
+            </a:extLst>
+          </p:cNvPr>
           <p:cNvSpPr>
             <a:spLocks noGrp="1"/>
           </p:cNvSpPr>
@@ -2536,9 +2378,9 @@
           <a:bodyPr/>
           <a:lstStyle/>
           <a:p>
-            <a:fld id="{F6606698-BDAE-417D-A65D-A2C440CD0FC2}" type="datetimeFigureOut">
+            <a:fld id="{C32AD3BE-FDB2-4E6E-AF52-0FC17BD47529}" type="datetimeFigureOut">
               <a:rPr lang="en-US" smtClean="0"/>
-              <a:t>10/15/2022</a:t>
+              <a:t>10/16/2022</a:t>
             </a:fld>
             <a:endParaRPr lang="en-US"/>
           </a:p>
@@ -2546,7 +2388,13 @@
       </p:sp>
       <p:sp>
         <p:nvSpPr>
-          <p:cNvPr id="6" name="Footer Placeholder 5"/>
+          <p:cNvPr id="6" name="Footer Placeholder 5">
+            <a:extLst>
+              <a:ext uri="{FF2B5EF4-FFF2-40B4-BE49-F238E27FC236}">
+                <a16:creationId xmlns:a16="http://schemas.microsoft.com/office/drawing/2014/main" id="{47058B39-35D6-FACF-345A-6C6C7CF7F089}"/>
+              </a:ext>
+            </a:extLst>
+          </p:cNvPr>
           <p:cNvSpPr>
             <a:spLocks noGrp="1"/>
           </p:cNvSpPr>
@@ -2565,7 +2413,13 @@
       </p:sp>
       <p:sp>
         <p:nvSpPr>
-          <p:cNvPr id="7" name="Slide Number Placeholder 6"/>
+          <p:cNvPr id="7" name="Slide Number Placeholder 6">
+            <a:extLst>
+              <a:ext uri="{FF2B5EF4-FFF2-40B4-BE49-F238E27FC236}">
+                <a16:creationId xmlns:a16="http://schemas.microsoft.com/office/drawing/2014/main" id="{EF9C13D4-DAF5-5390-17D4-E7A40D3C25B2}"/>
+              </a:ext>
+            </a:extLst>
+          </p:cNvPr>
           <p:cNvSpPr>
             <a:spLocks noGrp="1"/>
           </p:cNvSpPr>
@@ -2578,7 +2432,7 @@
           <a:bodyPr/>
           <a:lstStyle/>
           <a:p>
-            <a:fld id="{B8D60ABD-1DB8-4EBF-9803-33819397B5FC}" type="slidenum">
+            <a:fld id="{A849C772-AF0D-43AD-ADF6-6468DBE82806}" type="slidenum">
               <a:rPr lang="en-US" smtClean="0"/>
               <a:t>‹#›</a:t>
             </a:fld>
@@ -2589,7 +2443,7 @@
     </p:spTree>
     <p:extLst>
       <p:ext uri="{BB962C8B-B14F-4D97-AF65-F5344CB8AC3E}">
-        <p14:creationId xmlns:p14="http://schemas.microsoft.com/office/powerpoint/2010/main" val="2601335043"/>
+        <p14:creationId xmlns:p14="http://schemas.microsoft.com/office/powerpoint/2010/main" val="2319682216"/>
       </p:ext>
     </p:extLst>
   </p:cSld>
@@ -2618,7 +2472,13 @@
       </p:grpSpPr>
       <p:sp>
         <p:nvSpPr>
-          <p:cNvPr id="2" name="Title 1"/>
+          <p:cNvPr id="2" name="Title 1">
+            <a:extLst>
+              <a:ext uri="{FF2B5EF4-FFF2-40B4-BE49-F238E27FC236}">
+                <a16:creationId xmlns:a16="http://schemas.microsoft.com/office/drawing/2014/main" id="{07D3D036-3AB9-4B58-1367-4035C365B904}"/>
+              </a:ext>
+            </a:extLst>
+          </p:cNvPr>
           <p:cNvSpPr>
             <a:spLocks noGrp="1"/>
           </p:cNvSpPr>
@@ -2641,18 +2501,23 @@
           </a:lstStyle>
           <a:p>
             <a:r>
-              <a:rPr lang="en-GB"/>
+              <a:rPr lang="en-US"/>
               <a:t>Click to edit Master title style</a:t>
             </a:r>
-            <a:endParaRPr lang="en-US" dirty="0"/>
-          </a:p>
-        </p:txBody>
-      </p:sp>
-      <p:sp>
-        <p:nvSpPr>
-          <p:cNvPr id="3" name="Picture Placeholder 2"/>
-          <p:cNvSpPr>
-            <a:spLocks noGrp="1" noChangeAspect="1"/>
+          </a:p>
+        </p:txBody>
+      </p:sp>
+      <p:sp>
+        <p:nvSpPr>
+          <p:cNvPr id="3" name="Picture Placeholder 2">
+            <a:extLst>
+              <a:ext uri="{FF2B5EF4-FFF2-40B4-BE49-F238E27FC236}">
+                <a16:creationId xmlns:a16="http://schemas.microsoft.com/office/drawing/2014/main" id="{C91B1665-5754-8B53-D084-9F1D969834D0}"/>
+              </a:ext>
+            </a:extLst>
+          </p:cNvPr>
+          <p:cNvSpPr>
+            <a:spLocks noGrp="1"/>
           </p:cNvSpPr>
           <p:nvPr>
             <p:ph type="pic" idx="1"/>
@@ -2665,7 +2530,7 @@
           </a:xfrm>
         </p:spPr>
         <p:txBody>
-          <a:bodyPr anchor="t"/>
+          <a:bodyPr/>
           <a:lstStyle>
             <a:lvl1pPr marL="0" indent="0">
               <a:buNone/>
@@ -2705,17 +2570,19 @@
             </a:lvl9pPr>
           </a:lstStyle>
           <a:p>
-            <a:r>
-              <a:rPr lang="en-GB"/>
-              <a:t>Click icon to add picture</a:t>
-            </a:r>
-            <a:endParaRPr lang="en-US" dirty="0"/>
-          </a:p>
-        </p:txBody>
-      </p:sp>
-      <p:sp>
-        <p:nvSpPr>
-          <p:cNvPr id="4" name="Text Placeholder 3"/>
+            <a:endParaRPr lang="en-US"/>
+          </a:p>
+        </p:txBody>
+      </p:sp>
+      <p:sp>
+        <p:nvSpPr>
+          <p:cNvPr id="4" name="Text Placeholder 3">
+            <a:extLst>
+              <a:ext uri="{FF2B5EF4-FFF2-40B4-BE49-F238E27FC236}">
+                <a16:creationId xmlns:a16="http://schemas.microsoft.com/office/drawing/2014/main" id="{A464F0B8-D2BC-36A7-7B4F-28AA1C84FA62}"/>
+              </a:ext>
+            </a:extLst>
+          </p:cNvPr>
           <p:cNvSpPr>
             <a:spLocks noGrp="1"/>
           </p:cNvSpPr>
@@ -2772,7 +2639,7 @@
           <a:p>
             <a:pPr lvl="0"/>
             <a:r>
-              <a:rPr lang="en-GB"/>
+              <a:rPr lang="en-US"/>
               <a:t>Click to edit Master text styles</a:t>
             </a:r>
           </a:p>
@@ -2780,7 +2647,13 @@
       </p:sp>
       <p:sp>
         <p:nvSpPr>
-          <p:cNvPr id="5" name="Date Placeholder 4"/>
+          <p:cNvPr id="5" name="Date Placeholder 4">
+            <a:extLst>
+              <a:ext uri="{FF2B5EF4-FFF2-40B4-BE49-F238E27FC236}">
+                <a16:creationId xmlns:a16="http://schemas.microsoft.com/office/drawing/2014/main" id="{9A6ABD3E-9B6A-B196-9001-60A6C9DECC76}"/>
+              </a:ext>
+            </a:extLst>
+          </p:cNvPr>
           <p:cNvSpPr>
             <a:spLocks noGrp="1"/>
           </p:cNvSpPr>
@@ -2793,9 +2666,9 @@
           <a:bodyPr/>
           <a:lstStyle/>
           <a:p>
-            <a:fld id="{F6606698-BDAE-417D-A65D-A2C440CD0FC2}" type="datetimeFigureOut">
+            <a:fld id="{C32AD3BE-FDB2-4E6E-AF52-0FC17BD47529}" type="datetimeFigureOut">
               <a:rPr lang="en-US" smtClean="0"/>
-              <a:t>10/15/2022</a:t>
+              <a:t>10/16/2022</a:t>
             </a:fld>
             <a:endParaRPr lang="en-US"/>
           </a:p>
@@ -2803,7 +2676,13 @@
       </p:sp>
       <p:sp>
         <p:nvSpPr>
-          <p:cNvPr id="6" name="Footer Placeholder 5"/>
+          <p:cNvPr id="6" name="Footer Placeholder 5">
+            <a:extLst>
+              <a:ext uri="{FF2B5EF4-FFF2-40B4-BE49-F238E27FC236}">
+                <a16:creationId xmlns:a16="http://schemas.microsoft.com/office/drawing/2014/main" id="{12B31FAB-0302-C5F2-02F0-1FD236ECFE08}"/>
+              </a:ext>
+            </a:extLst>
+          </p:cNvPr>
           <p:cNvSpPr>
             <a:spLocks noGrp="1"/>
           </p:cNvSpPr>
@@ -2822,7 +2701,13 @@
       </p:sp>
       <p:sp>
         <p:nvSpPr>
-          <p:cNvPr id="7" name="Slide Number Placeholder 6"/>
+          <p:cNvPr id="7" name="Slide Number Placeholder 6">
+            <a:extLst>
+              <a:ext uri="{FF2B5EF4-FFF2-40B4-BE49-F238E27FC236}">
+                <a16:creationId xmlns:a16="http://schemas.microsoft.com/office/drawing/2014/main" id="{0C377C72-AB1C-6BB1-7911-47C1854D57A0}"/>
+              </a:ext>
+            </a:extLst>
+          </p:cNvPr>
           <p:cNvSpPr>
             <a:spLocks noGrp="1"/>
           </p:cNvSpPr>
@@ -2835,7 +2720,7 @@
           <a:bodyPr/>
           <a:lstStyle/>
           <a:p>
-            <a:fld id="{B8D60ABD-1DB8-4EBF-9803-33819397B5FC}" type="slidenum">
+            <a:fld id="{A849C772-AF0D-43AD-ADF6-6468DBE82806}" type="slidenum">
               <a:rPr lang="en-US" smtClean="0"/>
               <a:t>‹#›</a:t>
             </a:fld>
@@ -2846,7 +2731,7 @@
     </p:spTree>
     <p:extLst>
       <p:ext uri="{BB962C8B-B14F-4D97-AF65-F5344CB8AC3E}">
-        <p14:creationId xmlns:p14="http://schemas.microsoft.com/office/powerpoint/2010/main" val="2032461236"/>
+        <p14:creationId xmlns:p14="http://schemas.microsoft.com/office/powerpoint/2010/main" val="3605375818"/>
       </p:ext>
     </p:extLst>
   </p:cSld>
@@ -2880,7 +2765,13 @@
       </p:grpSpPr>
       <p:sp>
         <p:nvSpPr>
-          <p:cNvPr id="2" name="Title Placeholder 1"/>
+          <p:cNvPr id="2" name="Title Placeholder 1">
+            <a:extLst>
+              <a:ext uri="{FF2B5EF4-FFF2-40B4-BE49-F238E27FC236}">
+                <a16:creationId xmlns:a16="http://schemas.microsoft.com/office/drawing/2014/main" id="{FF77C5B7-666E-C551-1655-DF27428F8038}"/>
+              </a:ext>
+            </a:extLst>
+          </p:cNvPr>
           <p:cNvSpPr>
             <a:spLocks noGrp="1"/>
           </p:cNvSpPr>
@@ -2904,16 +2795,21 @@
           <a:lstStyle/>
           <a:p>
             <a:r>
-              <a:rPr lang="en-GB"/>
+              <a:rPr lang="en-US"/>
               <a:t>Click to edit Master title style</a:t>
             </a:r>
-            <a:endParaRPr lang="en-US" dirty="0"/>
-          </a:p>
-        </p:txBody>
-      </p:sp>
-      <p:sp>
-        <p:nvSpPr>
-          <p:cNvPr id="3" name="Text Placeholder 2"/>
+          </a:p>
+        </p:txBody>
+      </p:sp>
+      <p:sp>
+        <p:nvSpPr>
+          <p:cNvPr id="3" name="Text Placeholder 2">
+            <a:extLst>
+              <a:ext uri="{FF2B5EF4-FFF2-40B4-BE49-F238E27FC236}">
+                <a16:creationId xmlns:a16="http://schemas.microsoft.com/office/drawing/2014/main" id="{62841EDF-5BD9-B2BA-8958-A1A134687BED}"/>
+              </a:ext>
+            </a:extLst>
+          </p:cNvPr>
           <p:cNvSpPr>
             <a:spLocks noGrp="1"/>
           </p:cNvSpPr>
@@ -2938,44 +2834,49 @@
           <a:p>
             <a:pPr lvl="0"/>
             <a:r>
-              <a:rPr lang="en-GB"/>
+              <a:rPr lang="en-US"/>
               <a:t>Click to edit Master text styles</a:t>
             </a:r>
           </a:p>
           <a:p>
             <a:pPr lvl="1"/>
             <a:r>
-              <a:rPr lang="en-GB"/>
+              <a:rPr lang="en-US"/>
               <a:t>Second level</a:t>
             </a:r>
           </a:p>
           <a:p>
             <a:pPr lvl="2"/>
             <a:r>
-              <a:rPr lang="en-GB"/>
+              <a:rPr lang="en-US"/>
               <a:t>Third level</a:t>
             </a:r>
           </a:p>
           <a:p>
             <a:pPr lvl="3"/>
             <a:r>
-              <a:rPr lang="en-GB"/>
+              <a:rPr lang="en-US"/>
               <a:t>Fourth level</a:t>
             </a:r>
           </a:p>
           <a:p>
             <a:pPr lvl="4"/>
             <a:r>
-              <a:rPr lang="en-GB"/>
+              <a:rPr lang="en-US"/>
               <a:t>Fifth level</a:t>
             </a:r>
-            <a:endParaRPr lang="en-US" dirty="0"/>
-          </a:p>
-        </p:txBody>
-      </p:sp>
-      <p:sp>
-        <p:nvSpPr>
-          <p:cNvPr id="4" name="Date Placeholder 3"/>
+          </a:p>
+        </p:txBody>
+      </p:sp>
+      <p:sp>
+        <p:nvSpPr>
+          <p:cNvPr id="4" name="Date Placeholder 3">
+            <a:extLst>
+              <a:ext uri="{FF2B5EF4-FFF2-40B4-BE49-F238E27FC236}">
+                <a16:creationId xmlns:a16="http://schemas.microsoft.com/office/drawing/2014/main" id="{AEFE794B-7FA6-BE0C-D1B6-50F3A052D8CE}"/>
+              </a:ext>
+            </a:extLst>
+          </p:cNvPr>
           <p:cNvSpPr>
             <a:spLocks noGrp="1"/>
           </p:cNvSpPr>
@@ -3006,9 +2907,9 @@
             </a:lvl1pPr>
           </a:lstStyle>
           <a:p>
-            <a:fld id="{F6606698-BDAE-417D-A65D-A2C440CD0FC2}" type="datetimeFigureOut">
+            <a:fld id="{C32AD3BE-FDB2-4E6E-AF52-0FC17BD47529}" type="datetimeFigureOut">
               <a:rPr lang="en-US" smtClean="0"/>
-              <a:t>10/15/2022</a:t>
+              <a:t>10/16/2022</a:t>
             </a:fld>
             <a:endParaRPr lang="en-US"/>
           </a:p>
@@ -3016,7 +2917,13 @@
       </p:sp>
       <p:sp>
         <p:nvSpPr>
-          <p:cNvPr id="5" name="Footer Placeholder 4"/>
+          <p:cNvPr id="5" name="Footer Placeholder 4">
+            <a:extLst>
+              <a:ext uri="{FF2B5EF4-FFF2-40B4-BE49-F238E27FC236}">
+                <a16:creationId xmlns:a16="http://schemas.microsoft.com/office/drawing/2014/main" id="{E83658ED-0ED8-DF98-73E0-D5DCC57FBBD0}"/>
+              </a:ext>
+            </a:extLst>
+          </p:cNvPr>
           <p:cNvSpPr>
             <a:spLocks noGrp="1"/>
           </p:cNvSpPr>
@@ -3053,7 +2960,13 @@
       </p:sp>
       <p:sp>
         <p:nvSpPr>
-          <p:cNvPr id="6" name="Slide Number Placeholder 5"/>
+          <p:cNvPr id="6" name="Slide Number Placeholder 5">
+            <a:extLst>
+              <a:ext uri="{FF2B5EF4-FFF2-40B4-BE49-F238E27FC236}">
+                <a16:creationId xmlns:a16="http://schemas.microsoft.com/office/drawing/2014/main" id="{4714FA71-F553-B092-1797-BF0E73004C65}"/>
+              </a:ext>
+            </a:extLst>
+          </p:cNvPr>
           <p:cNvSpPr>
             <a:spLocks noGrp="1"/>
           </p:cNvSpPr>
@@ -3084,7 +2997,7 @@
             </a:lvl1pPr>
           </a:lstStyle>
           <a:p>
-            <a:fld id="{B8D60ABD-1DB8-4EBF-9803-33819397B5FC}" type="slidenum">
+            <a:fld id="{A849C772-AF0D-43AD-ADF6-6468DBE82806}" type="slidenum">
               <a:rPr lang="en-US" smtClean="0"/>
               <a:t>‹#›</a:t>
             </a:fld>
@@ -3095,23 +3008,23 @@
     </p:spTree>
     <p:extLst>
       <p:ext uri="{BB962C8B-B14F-4D97-AF65-F5344CB8AC3E}">
-        <p14:creationId xmlns:p14="http://schemas.microsoft.com/office/powerpoint/2010/main" val="3274416052"/>
+        <p14:creationId xmlns:p14="http://schemas.microsoft.com/office/powerpoint/2010/main" val="1587455152"/>
       </p:ext>
     </p:extLst>
   </p:cSld>
   <p:clrMap bg1="lt1" tx1="dk1" bg2="lt2" tx2="dk2" accent1="accent1" accent2="accent2" accent3="accent3" accent4="accent4" accent5="accent5" accent6="accent6" hlink="hlink" folHlink="folHlink"/>
   <p:sldLayoutIdLst>
-    <p:sldLayoutId id="2147483673" r:id="rId1"/>
-    <p:sldLayoutId id="2147483674" r:id="rId2"/>
-    <p:sldLayoutId id="2147483675" r:id="rId3"/>
-    <p:sldLayoutId id="2147483676" r:id="rId4"/>
-    <p:sldLayoutId id="2147483677" r:id="rId5"/>
-    <p:sldLayoutId id="2147483678" r:id="rId6"/>
-    <p:sldLayoutId id="2147483679" r:id="rId7"/>
-    <p:sldLayoutId id="2147483680" r:id="rId8"/>
-    <p:sldLayoutId id="2147483681" r:id="rId9"/>
-    <p:sldLayoutId id="2147483682" r:id="rId10"/>
-    <p:sldLayoutId id="2147483683" r:id="rId11"/>
+    <p:sldLayoutId id="2147483649" r:id="rId1"/>
+    <p:sldLayoutId id="2147483650" r:id="rId2"/>
+    <p:sldLayoutId id="2147483651" r:id="rId3"/>
+    <p:sldLayoutId id="2147483652" r:id="rId4"/>
+    <p:sldLayoutId id="2147483653" r:id="rId5"/>
+    <p:sldLayoutId id="2147483654" r:id="rId6"/>
+    <p:sldLayoutId id="2147483655" r:id="rId7"/>
+    <p:sldLayoutId id="2147483656" r:id="rId8"/>
+    <p:sldLayoutId id="2147483657" r:id="rId9"/>
+    <p:sldLayoutId id="2147483658" r:id="rId10"/>
+    <p:sldLayoutId id="2147483659" r:id="rId11"/>
   </p:sldLayoutIdLst>
   <p:txStyles>
     <p:titleStyle>
@@ -3418,7 +3331,7 @@
           <p:cNvPr id="2" name="Rounded Rectangle 1">
             <a:extLst>
               <a:ext uri="{FF2B5EF4-FFF2-40B4-BE49-F238E27FC236}">
-                <a16:creationId xmlns:a16="http://schemas.microsoft.com/office/drawing/2014/main" id="{6BBD2366-7CAA-A24A-AF4F-380D2860C0BA}"/>
+                <a16:creationId xmlns:a16="http://schemas.microsoft.com/office/drawing/2014/main" id="{3A9149CB-7D1E-45A3-E7B5-B0DD202BDF9C}"/>
               </a:ext>
             </a:extLst>
           </p:cNvPr>
@@ -3483,10 +3396,10 @@
       </p:sp>
       <p:sp>
         <p:nvSpPr>
-          <p:cNvPr id="4" name="TextBox 3">
-            <a:extLst>
-              <a:ext uri="{FF2B5EF4-FFF2-40B4-BE49-F238E27FC236}">
-                <a16:creationId xmlns:a16="http://schemas.microsoft.com/office/drawing/2014/main" id="{C9E6DCC8-A217-4CF8-9FE9-5A68DD4AF0FB}"/>
+          <p:cNvPr id="3" name="TextBox 2">
+            <a:extLst>
+              <a:ext uri="{FF2B5EF4-FFF2-40B4-BE49-F238E27FC236}">
+                <a16:creationId xmlns:a16="http://schemas.microsoft.com/office/drawing/2014/main" id="{A1EFA327-EB66-2415-A3BA-5A20883AA4ED}"/>
               </a:ext>
             </a:extLst>
           </p:cNvPr>
@@ -3495,32 +3408,82 @@
         </p:nvSpPr>
         <p:spPr>
           <a:xfrm>
-            <a:off x="694280" y="2054431"/>
-            <a:ext cx="10803437" cy="4586387"/>
+            <a:off x="716096" y="1639981"/>
+            <a:ext cx="10741446" cy="4868395"/>
           </a:xfrm>
           <a:prstGeom prst="rect">
             <a:avLst/>
           </a:prstGeom>
           <a:noFill/>
-          <a:ln w="76200">
-            <a:noFill/>
-          </a:ln>
         </p:spPr>
         <p:txBody>
-          <a:bodyPr wrap="square" numCol="1" rtlCol="0" anchor="ctr">
-            <a:normAutofit/>
+          <a:bodyPr wrap="square" rtlCol="0" anchor="ctr">
+            <a:normAutofit fontScale="55000" lnSpcReduction="20000"/>
           </a:bodyPr>
           <a:lstStyle/>
           <a:p>
             <a:pPr algn="ctr"/>
-            <a:endParaRPr lang="en-GB" sz="4800" b="1" cap="all" dirty="0"/>
+            <a:r>
+              <a:rPr lang="en-US" sz="8000" b="1"/>
+              <a:t>SUCIU IOAN</a:t>
+            </a:r>
+          </a:p>
+          <a:p>
+            <a:pPr algn="ctr"/>
+            <a:r>
+              <a:rPr lang="en-US" sz="8000" b="1"/>
+              <a:t>ROSCA MARIA</a:t>
+            </a:r>
+          </a:p>
+          <a:p>
+            <a:pPr algn="ctr"/>
+            <a:r>
+              <a:rPr lang="en-US" sz="8000" b="1"/>
+              <a:t>FINDEIS CRISTINA</a:t>
+            </a:r>
+          </a:p>
+          <a:p>
+            <a:pPr algn="ctr"/>
+            <a:r>
+              <a:rPr lang="en-US" sz="8000" b="1"/>
+              <a:t>BRANDZANIC MARCEL - IVAN</a:t>
+            </a:r>
+          </a:p>
+          <a:p>
+            <a:pPr algn="ctr"/>
+            <a:r>
+              <a:rPr lang="en-US" sz="8000" b="1"/>
+              <a:t>MUSKA MIHAELA</a:t>
+            </a:r>
+          </a:p>
+          <a:p>
+            <a:pPr algn="ctr"/>
+            <a:r>
+              <a:rPr lang="en-US" sz="8000" b="1"/>
+              <a:t>JENTIMIR LAURA</a:t>
+            </a:r>
+          </a:p>
+          <a:p>
+            <a:pPr algn="ctr"/>
+            <a:r>
+              <a:rPr lang="en-US" sz="8000" b="1"/>
+              <a:t>POPA NARCIS ADRIAN</a:t>
+            </a:r>
+          </a:p>
+          <a:p>
+            <a:pPr algn="ctr"/>
+            <a:r>
+              <a:rPr lang="en-US" sz="8000" b="1"/>
+              <a:t>TATARU BEATRICE</a:t>
+            </a:r>
+            <a:endParaRPr lang="en-US" sz="8000" b="1" dirty="0"/>
           </a:p>
         </p:txBody>
       </p:sp>
     </p:spTree>
     <p:extLst>
       <p:ext uri="{BB962C8B-B14F-4D97-AF65-F5344CB8AC3E}">
-        <p14:creationId xmlns:p14="http://schemas.microsoft.com/office/powerpoint/2010/main" val="3447501189"/>
+        <p14:creationId xmlns:p14="http://schemas.microsoft.com/office/powerpoint/2010/main" val="3063670245"/>
       </p:ext>
     </p:extLst>
   </p:cSld>
@@ -3533,7 +3496,7 @@
 <file path=ppt/theme/theme1.xml><?xml version="1.0" encoding="utf-8"?>
 <a:theme xmlns:a="http://schemas.openxmlformats.org/drawingml/2006/main" name="Office Theme">
   <a:themeElements>
-    <a:clrScheme name="Office Theme">
+    <a:clrScheme name="Office">
       <a:dk1>
         <a:sysClr val="windowText" lastClr="000000"/>
       </a:dk1>
@@ -3560,267 +3523,6 @@
       </a:accent4>
       <a:accent5>
         <a:srgbClr val="5B9BD5"/>
-      </a:accent5>
-      <a:accent6>
-        <a:srgbClr val="70AD47"/>
-      </a:accent6>
-      <a:hlink>
-        <a:srgbClr val="0563C1"/>
-      </a:hlink>
-      <a:folHlink>
-        <a:srgbClr val="954F72"/>
-      </a:folHlink>
-    </a:clrScheme>
-    <a:fontScheme name="Office Theme">
-      <a:majorFont>
-        <a:latin typeface="Calibri Light" panose="020F0302020204030204"/>
-        <a:ea typeface=""/>
-        <a:cs typeface=""/>
-        <a:font script="Jpan" typeface="游ゴシック Light"/>
-        <a:font script="Hang" typeface="맑은 고딕"/>
-        <a:font script="Hans" typeface="等线 Light"/>
-        <a:font script="Hant" typeface="新細明體"/>
-        <a:font script="Arab" typeface="Times New Roman"/>
-        <a:font script="Hebr" typeface="Times New Roman"/>
-        <a:font script="Thai" typeface="Angsana New"/>
-        <a:font script="Ethi" typeface="Nyala"/>
-        <a:font script="Beng" typeface="Vrinda"/>
-        <a:font script="Gujr" typeface="Shruti"/>
-        <a:font script="Khmr" typeface="MoolBoran"/>
-        <a:font script="Knda" typeface="Tunga"/>
-        <a:font script="Guru" typeface="Raavi"/>
-        <a:font script="Cans" typeface="Euphemia"/>
-        <a:font script="Cher" typeface="Plantagenet Cherokee"/>
-        <a:font script="Yiii" typeface="Microsoft Yi Baiti"/>
-        <a:font script="Tibt" typeface="Microsoft Himalaya"/>
-        <a:font script="Thaa" typeface="MV Boli"/>
-        <a:font script="Deva" typeface="Mangal"/>
-        <a:font script="Telu" typeface="Gautami"/>
-        <a:font script="Taml" typeface="Latha"/>
-        <a:font script="Syrc" typeface="Estrangelo Edessa"/>
-        <a:font script="Orya" typeface="Kalinga"/>
-        <a:font script="Mlym" typeface="Kartika"/>
-        <a:font script="Laoo" typeface="DokChampa"/>
-        <a:font script="Sinh" typeface="Iskoola Pota"/>
-        <a:font script="Mong" typeface="Mongolian Baiti"/>
-        <a:font script="Viet" typeface="Times New Roman"/>
-        <a:font script="Uigh" typeface="Microsoft Uighur"/>
-        <a:font script="Geor" typeface="Sylfaen"/>
-      </a:majorFont>
-      <a:minorFont>
-        <a:latin typeface="Calibri" panose="020F0502020204030204"/>
-        <a:ea typeface=""/>
-        <a:cs typeface=""/>
-        <a:font script="Jpan" typeface="游ゴシック"/>
-        <a:font script="Hang" typeface="맑은 고딕"/>
-        <a:font script="Hans" typeface="等线"/>
-        <a:font script="Hant" typeface="新細明體"/>
-        <a:font script="Arab" typeface="Arial"/>
-        <a:font script="Hebr" typeface="Arial"/>
-        <a:font script="Thai" typeface="Cordia New"/>
-        <a:font script="Ethi" typeface="Nyala"/>
-        <a:font script="Beng" typeface="Vrinda"/>
-        <a:font script="Gujr" typeface="Shruti"/>
-        <a:font script="Khmr" typeface="DaunPenh"/>
-        <a:font script="Knda" typeface="Tunga"/>
-        <a:font script="Guru" typeface="Raavi"/>
-        <a:font script="Cans" typeface="Euphemia"/>
-        <a:font script="Cher" typeface="Plantagenet Cherokee"/>
-        <a:font script="Yiii" typeface="Microsoft Yi Baiti"/>
-        <a:font script="Tibt" typeface="Microsoft Himalaya"/>
-        <a:font script="Thaa" typeface="MV Boli"/>
-        <a:font script="Deva" typeface="Mangal"/>
-        <a:font script="Telu" typeface="Gautami"/>
-        <a:font script="Taml" typeface="Latha"/>
-        <a:font script="Syrc" typeface="Estrangelo Edessa"/>
-        <a:font script="Orya" typeface="Kalinga"/>
-        <a:font script="Mlym" typeface="Kartika"/>
-        <a:font script="Laoo" typeface="DokChampa"/>
-        <a:font script="Sinh" typeface="Iskoola Pota"/>
-        <a:font script="Mong" typeface="Mongolian Baiti"/>
-        <a:font script="Viet" typeface="Arial"/>
-        <a:font script="Uigh" typeface="Microsoft Uighur"/>
-        <a:font script="Geor" typeface="Sylfaen"/>
-      </a:minorFont>
-    </a:fontScheme>
-    <a:fmtScheme name="Office Theme">
-      <a:fillStyleLst>
-        <a:solidFill>
-          <a:schemeClr val="phClr"/>
-        </a:solidFill>
-        <a:gradFill rotWithShape="1">
-          <a:gsLst>
-            <a:gs pos="0">
-              <a:schemeClr val="phClr">
-                <a:lumMod val="110000"/>
-                <a:satMod val="105000"/>
-                <a:tint val="67000"/>
-              </a:schemeClr>
-            </a:gs>
-            <a:gs pos="50000">
-              <a:schemeClr val="phClr">
-                <a:lumMod val="105000"/>
-                <a:satMod val="103000"/>
-                <a:tint val="73000"/>
-              </a:schemeClr>
-            </a:gs>
-            <a:gs pos="100000">
-              <a:schemeClr val="phClr">
-                <a:lumMod val="105000"/>
-                <a:satMod val="109000"/>
-                <a:tint val="81000"/>
-              </a:schemeClr>
-            </a:gs>
-          </a:gsLst>
-          <a:lin ang="5400000" scaled="0"/>
-        </a:gradFill>
-        <a:gradFill rotWithShape="1">
-          <a:gsLst>
-            <a:gs pos="0">
-              <a:schemeClr val="phClr">
-                <a:satMod val="103000"/>
-                <a:lumMod val="102000"/>
-                <a:tint val="94000"/>
-              </a:schemeClr>
-            </a:gs>
-            <a:gs pos="50000">
-              <a:schemeClr val="phClr">
-                <a:satMod val="110000"/>
-                <a:lumMod val="100000"/>
-                <a:shade val="100000"/>
-              </a:schemeClr>
-            </a:gs>
-            <a:gs pos="100000">
-              <a:schemeClr val="phClr">
-                <a:lumMod val="99000"/>
-                <a:satMod val="120000"/>
-                <a:shade val="78000"/>
-              </a:schemeClr>
-            </a:gs>
-          </a:gsLst>
-          <a:lin ang="5400000" scaled="0"/>
-        </a:gradFill>
-      </a:fillStyleLst>
-      <a:lnStyleLst>
-        <a:ln w="6350" cap="flat" cmpd="sng" algn="ctr">
-          <a:solidFill>
-            <a:schemeClr val="phClr"/>
-          </a:solidFill>
-          <a:prstDash val="solid"/>
-          <a:miter lim="800000"/>
-        </a:ln>
-        <a:ln w="12700" cap="flat" cmpd="sng" algn="ctr">
-          <a:solidFill>
-            <a:schemeClr val="phClr"/>
-          </a:solidFill>
-          <a:prstDash val="solid"/>
-          <a:miter lim="800000"/>
-        </a:ln>
-        <a:ln w="19050" cap="flat" cmpd="sng" algn="ctr">
-          <a:solidFill>
-            <a:schemeClr val="phClr"/>
-          </a:solidFill>
-          <a:prstDash val="solid"/>
-          <a:miter lim="800000"/>
-        </a:ln>
-      </a:lnStyleLst>
-      <a:effectStyleLst>
-        <a:effectStyle>
-          <a:effectLst/>
-        </a:effectStyle>
-        <a:effectStyle>
-          <a:effectLst/>
-        </a:effectStyle>
-        <a:effectStyle>
-          <a:effectLst>
-            <a:outerShdw blurRad="57150" dist="19050" dir="5400000" algn="ctr" rotWithShape="0">
-              <a:srgbClr val="000000">
-                <a:alpha val="63000"/>
-              </a:srgbClr>
-            </a:outerShdw>
-          </a:effectLst>
-        </a:effectStyle>
-      </a:effectStyleLst>
-      <a:bgFillStyleLst>
-        <a:solidFill>
-          <a:schemeClr val="phClr"/>
-        </a:solidFill>
-        <a:solidFill>
-          <a:schemeClr val="phClr">
-            <a:tint val="95000"/>
-            <a:satMod val="170000"/>
-          </a:schemeClr>
-        </a:solidFill>
-        <a:gradFill rotWithShape="1">
-          <a:gsLst>
-            <a:gs pos="0">
-              <a:schemeClr val="phClr">
-                <a:tint val="93000"/>
-                <a:satMod val="150000"/>
-                <a:shade val="98000"/>
-                <a:lumMod val="102000"/>
-              </a:schemeClr>
-            </a:gs>
-            <a:gs pos="50000">
-              <a:schemeClr val="phClr">
-                <a:tint val="98000"/>
-                <a:satMod val="130000"/>
-                <a:shade val="90000"/>
-                <a:lumMod val="103000"/>
-              </a:schemeClr>
-            </a:gs>
-            <a:gs pos="100000">
-              <a:schemeClr val="phClr">
-                <a:shade val="63000"/>
-                <a:satMod val="120000"/>
-              </a:schemeClr>
-            </a:gs>
-          </a:gsLst>
-          <a:lin ang="5400000" scaled="0"/>
-        </a:gradFill>
-      </a:bgFillStyleLst>
-    </a:fmtScheme>
-  </a:themeElements>
-  <a:objectDefaults/>
-  <a:extraClrSchemeLst/>
-  <a:extLst>
-    <a:ext uri="{05A4C25C-085E-4340-85A3-A5531E510DB2}">
-      <thm15:themeFamily xmlns:thm15="http://schemas.microsoft.com/office/thememl/2012/main" name="Office Theme" id="{62F939B6-93AF-4DB8-9C6B-D6C7DFDC589F}" vid="{4A3C46E8-61CC-4603-A589-7422A47A8E4A}"/>
-    </a:ext>
-  </a:extLst>
-</a:theme>
-</file>
-
-<file path=ppt/theme/theme2.xml><?xml version="1.0" encoding="utf-8"?>
-<a:theme xmlns:a="http://schemas.openxmlformats.org/drawingml/2006/main" name="Temă Office">
-  <a:themeElements>
-    <a:clrScheme name="Office">
-      <a:dk1>
-        <a:sysClr val="windowText" lastClr="000000"/>
-      </a:dk1>
-      <a:lt1>
-        <a:sysClr val="window" lastClr="FFFFFF"/>
-      </a:lt1>
-      <a:dk2>
-        <a:srgbClr val="44546A"/>
-      </a:dk2>
-      <a:lt2>
-        <a:srgbClr val="E7E6E6"/>
-      </a:lt2>
-      <a:accent1>
-        <a:srgbClr val="5B9BD5"/>
-      </a:accent1>
-      <a:accent2>
-        <a:srgbClr val="ED7D31"/>
-      </a:accent2>
-      <a:accent3>
-        <a:srgbClr val="A5A5A5"/>
-      </a:accent3>
-      <a:accent4>
-        <a:srgbClr val="FFC000"/>
-      </a:accent4>
-      <a:accent5>
-        <a:srgbClr val="4472C4"/>
       </a:accent5>
       <a:accent6>
         <a:srgbClr val="70AD47"/>

</xml_diff>